<commit_message>
updated lesson 1 slides:
</commit_message>
<xml_diff>
--- a/01_introduction_to_python_part_i/slides.pptx
+++ b/01_introduction_to_python_part_i/slides.pptx
@@ -5,20 +5,21 @@
     <p:sldMasterId id="2147483660" r:id="rId1"/>
   </p:sldMasterIdLst>
   <p:notesMasterIdLst>
-    <p:notesMasterId r:id="rId13"/>
+    <p:notesMasterId r:id="rId14"/>
   </p:notesMasterIdLst>
   <p:sldIdLst>
-    <p:sldId id="256" r:id="rId2"/>
-    <p:sldId id="258" r:id="rId3"/>
-    <p:sldId id="259" r:id="rId4"/>
-    <p:sldId id="261" r:id="rId5"/>
-    <p:sldId id="260" r:id="rId6"/>
-    <p:sldId id="257" r:id="rId7"/>
-    <p:sldId id="262" r:id="rId8"/>
-    <p:sldId id="263" r:id="rId9"/>
-    <p:sldId id="271" r:id="rId10"/>
-    <p:sldId id="272" r:id="rId11"/>
-    <p:sldId id="265" r:id="rId12"/>
+    <p:sldId id="273" r:id="rId2"/>
+    <p:sldId id="256" r:id="rId3"/>
+    <p:sldId id="258" r:id="rId4"/>
+    <p:sldId id="259" r:id="rId5"/>
+    <p:sldId id="261" r:id="rId6"/>
+    <p:sldId id="260" r:id="rId7"/>
+    <p:sldId id="257" r:id="rId8"/>
+    <p:sldId id="262" r:id="rId9"/>
+    <p:sldId id="263" r:id="rId10"/>
+    <p:sldId id="271" r:id="rId11"/>
+    <p:sldId id="272" r:id="rId12"/>
+    <p:sldId id="265" r:id="rId13"/>
   </p:sldIdLst>
   <p:sldSz cx="9144000" cy="6858000" type="screen4x3"/>
   <p:notesSz cx="6858000" cy="9144000"/>
@@ -207,7 +208,7 @@
           <a:p>
             <a:fld id="{FE1BA87C-04DC-4E4F-8A0F-F4C0AE996CF7}" type="datetimeFigureOut">
               <a:rPr lang="en-US" smtClean="0"/>
-              <a:t>8/25/19</a:t>
+              <a:t>8/27/19</a:t>
             </a:fld>
             <a:endParaRPr lang="en-US"/>
           </a:p>
@@ -539,7 +540,7 @@
           <a:p>
             <a:fld id="{DD92E604-2188-D74A-A057-CDD40C0C1380}" type="slidenum">
               <a:rPr lang="en-US" smtClean="0"/>
-              <a:t>1</a:t>
+              <a:t>2</a:t>
             </a:fld>
             <a:endParaRPr lang="en-US"/>
           </a:p>
@@ -689,7 +690,7 @@
           <a:p>
             <a:fld id="{C764DE79-268F-4C1A-8933-263129D2AF90}" type="datetimeFigureOut">
               <a:rPr lang="en-US" dirty="0"/>
-              <a:t>8/25/19</a:t>
+              <a:t>8/27/19</a:t>
             </a:fld>
             <a:endParaRPr lang="en-US" dirty="0"/>
           </a:p>
@@ -867,7 +868,7 @@
           <a:p>
             <a:fld id="{A9473904-39EC-F544-B9DC-0F99F641AF46}" type="datetimeFigureOut">
               <a:rPr lang="en-US" smtClean="0"/>
-              <a:t>8/25/19</a:t>
+              <a:t>8/27/19</a:t>
             </a:fld>
             <a:endParaRPr lang="en-US"/>
           </a:p>
@@ -1055,7 +1056,7 @@
           <a:p>
             <a:fld id="{A9473904-39EC-F544-B9DC-0F99F641AF46}" type="datetimeFigureOut">
               <a:rPr lang="en-US" smtClean="0"/>
-              <a:t>8/25/19</a:t>
+              <a:t>8/27/19</a:t>
             </a:fld>
             <a:endParaRPr lang="en-US"/>
           </a:p>
@@ -1361,7 +1362,7 @@
           <a:p>
             <a:fld id="{A9473904-39EC-F544-B9DC-0F99F641AF46}" type="datetimeFigureOut">
               <a:rPr lang="en-US" smtClean="0"/>
-              <a:t>8/25/19</a:t>
+              <a:t>8/27/19</a:t>
             </a:fld>
             <a:endParaRPr lang="en-US"/>
           </a:p>
@@ -1613,7 +1614,7 @@
           <a:p>
             <a:fld id="{A9473904-39EC-F544-B9DC-0F99F641AF46}" type="datetimeFigureOut">
               <a:rPr lang="en-US" smtClean="0"/>
-              <a:t>8/25/19</a:t>
+              <a:t>8/27/19</a:t>
             </a:fld>
             <a:endParaRPr lang="en-US"/>
           </a:p>
@@ -1853,7 +1854,7 @@
           <a:p>
             <a:fld id="{A9473904-39EC-F544-B9DC-0F99F641AF46}" type="datetimeFigureOut">
               <a:rPr lang="en-US" smtClean="0"/>
-              <a:t>8/25/19</a:t>
+              <a:t>8/27/19</a:t>
             </a:fld>
             <a:endParaRPr lang="en-US"/>
           </a:p>
@@ -2228,7 +2229,7 @@
           <a:p>
             <a:fld id="{A9473904-39EC-F544-B9DC-0F99F641AF46}" type="datetimeFigureOut">
               <a:rPr lang="en-US" smtClean="0"/>
-              <a:t>8/25/19</a:t>
+              <a:t>8/27/19</a:t>
             </a:fld>
             <a:endParaRPr lang="en-US"/>
           </a:p>
@@ -2354,7 +2355,7 @@
           <a:p>
             <a:fld id="{A9473904-39EC-F544-B9DC-0F99F641AF46}" type="datetimeFigureOut">
               <a:rPr lang="en-US" smtClean="0"/>
-              <a:t>8/25/19</a:t>
+              <a:t>8/27/19</a:t>
             </a:fld>
             <a:endParaRPr lang="en-US"/>
           </a:p>
@@ -2457,7 +2458,7 @@
           <a:p>
             <a:fld id="{A9473904-39EC-F544-B9DC-0F99F641AF46}" type="datetimeFigureOut">
               <a:rPr lang="en-US" smtClean="0"/>
-              <a:t>8/25/19</a:t>
+              <a:t>8/27/19</a:t>
             </a:fld>
             <a:endParaRPr lang="en-US"/>
           </a:p>
@@ -2742,7 +2743,7 @@
           <a:p>
             <a:fld id="{A9473904-39EC-F544-B9DC-0F99F641AF46}" type="datetimeFigureOut">
               <a:rPr lang="en-US" smtClean="0"/>
-              <a:t>8/25/19</a:t>
+              <a:t>8/27/19</a:t>
             </a:fld>
             <a:endParaRPr lang="en-US"/>
           </a:p>
@@ -3007,7 +3008,7 @@
           <a:p>
             <a:fld id="{A9473904-39EC-F544-B9DC-0F99F641AF46}" type="datetimeFigureOut">
               <a:rPr lang="en-US" smtClean="0"/>
-              <a:t>8/25/19</a:t>
+              <a:t>8/27/19</a:t>
             </a:fld>
             <a:endParaRPr lang="en-US"/>
           </a:p>
@@ -3226,7 +3227,7 @@
           <a:p>
             <a:fld id="{A9473904-39EC-F544-B9DC-0F99F641AF46}" type="datetimeFigureOut">
               <a:rPr lang="en-US" smtClean="0"/>
-              <a:t>8/25/19</a:t>
+              <a:t>8/27/19</a:t>
             </a:fld>
             <a:endParaRPr lang="en-US"/>
           </a:p>
@@ -3640,66 +3641,143 @@
       </p:grpSpPr>
       <p:sp>
         <p:nvSpPr>
-          <p:cNvPr id="2" name="Title 1">
+          <p:cNvPr id="4" name="TextBox 3">
             <a:extLst>
               <a:ext uri="{FF2B5EF4-FFF2-40B4-BE49-F238E27FC236}">
-                <a16:creationId xmlns:a16="http://schemas.microsoft.com/office/drawing/2014/main" id="{7F787123-B70F-0249-8261-D5528BA0FF06}"/>
+                <a16:creationId xmlns:a16="http://schemas.microsoft.com/office/drawing/2014/main" id="{9932CE00-E1AC-C444-AB65-A5012430C7A8}"/>
               </a:ext>
             </a:extLst>
           </p:cNvPr>
-          <p:cNvSpPr>
-            <a:spLocks noGrp="1"/>
-          </p:cNvSpPr>
-          <p:nvPr>
-            <p:ph type="ctrTitle"/>
-          </p:nvPr>
-        </p:nvSpPr>
-        <p:spPr>
-          <a:xfrm>
-            <a:off x="1143000" y="1699022"/>
-            <a:ext cx="6858000" cy="1790700"/>
-          </a:xfrm>
-        </p:spPr>
-        <p:txBody>
-          <a:bodyPr/>
-          <a:lstStyle/>
-          <a:p>
-            <a:r>
-              <a:rPr lang="en-US" dirty="0"/>
-              <a:t>How to python and variable types</a:t>
-            </a:r>
-          </a:p>
-        </p:txBody>
-      </p:sp>
-      <p:sp>
-        <p:nvSpPr>
-          <p:cNvPr id="3" name="Subtitle 2">
+          <p:cNvSpPr txBox="1"/>
+          <p:nvPr/>
+        </p:nvSpPr>
+        <p:spPr>
+          <a:xfrm>
+            <a:off x="551793" y="1120255"/>
+            <a:ext cx="8040414" cy="954107"/>
+          </a:xfrm>
+          <a:prstGeom prst="rect">
+            <a:avLst/>
+          </a:prstGeom>
+          <a:noFill/>
+        </p:spPr>
+        <p:txBody>
+          <a:bodyPr wrap="square" rtlCol="0">
+            <a:spAutoFit/>
+          </a:bodyPr>
+          <a:lstStyle/>
+          <a:p>
+            <a:r>
+              <a:rPr lang="en-US" sz="2800" dirty="0">
+                <a:latin typeface="Helvetica Light" panose="020B0403020202020204" pitchFamily="34" charset="0"/>
+                <a:hlinkClick r:id="rId2"/>
+              </a:rPr>
+              <a:t>https://github.com/jyesselm/Chem991E</a:t>
+            </a:r>
+            <a:r>
+              <a:rPr lang="en-US" sz="2800" dirty="0">
+                <a:latin typeface="Helvetica Light" panose="020B0403020202020204" pitchFamily="34" charset="0"/>
+              </a:rPr>
+              <a:t> all course info</a:t>
+            </a:r>
+          </a:p>
+        </p:txBody>
+      </p:sp>
+      <p:sp>
+        <p:nvSpPr>
+          <p:cNvPr id="5" name="TextBox 4">
             <a:extLst>
               <a:ext uri="{FF2B5EF4-FFF2-40B4-BE49-F238E27FC236}">
-                <a16:creationId xmlns:a16="http://schemas.microsoft.com/office/drawing/2014/main" id="{BE2283A0-D14E-8A47-A1EF-DF1C981E4DBA}"/>
+                <a16:creationId xmlns:a16="http://schemas.microsoft.com/office/drawing/2014/main" id="{DD514E9A-4C51-5042-836F-B1A1F75185A4}"/>
               </a:ext>
             </a:extLst>
           </p:cNvPr>
-          <p:cNvSpPr>
-            <a:spLocks noGrp="1"/>
-          </p:cNvSpPr>
-          <p:nvPr>
-            <p:ph type="subTitle" idx="1"/>
-          </p:nvPr>
-        </p:nvSpPr>
-        <p:spPr/>
-        <p:txBody>
-          <a:bodyPr/>
-          <a:lstStyle/>
-          <a:p>
-            <a:endParaRPr lang="en-US"/>
+          <p:cNvSpPr txBox="1"/>
+          <p:nvPr/>
+        </p:nvSpPr>
+        <p:spPr>
+          <a:xfrm>
+            <a:off x="551793" y="2221238"/>
+            <a:ext cx="8040414" cy="954107"/>
+          </a:xfrm>
+          <a:prstGeom prst="rect">
+            <a:avLst/>
+          </a:prstGeom>
+          <a:noFill/>
+        </p:spPr>
+        <p:txBody>
+          <a:bodyPr wrap="square" rtlCol="0">
+            <a:spAutoFit/>
+          </a:bodyPr>
+          <a:lstStyle/>
+          <a:p>
+            <a:r>
+              <a:rPr lang="en-US" sz="2800" dirty="0">
+                <a:latin typeface="Helvetica Light" panose="020B0403020202020204" pitchFamily="34" charset="0"/>
+                <a:hlinkClick r:id="rId3"/>
+              </a:rPr>
+              <a:t>https://github.com/jyesselm/Chem991E/tree/master/00_getting_started</a:t>
+            </a:r>
+            <a:r>
+              <a:rPr lang="en-US" sz="2800" dirty="0">
+                <a:latin typeface="Helvetica Light" panose="020B0403020202020204" pitchFamily="34" charset="0"/>
+              </a:rPr>
+              <a:t> how to get python running</a:t>
+            </a:r>
+          </a:p>
+        </p:txBody>
+      </p:sp>
+      <p:sp>
+        <p:nvSpPr>
+          <p:cNvPr id="6" name="TextBox 5">
+            <a:extLst>
+              <a:ext uri="{FF2B5EF4-FFF2-40B4-BE49-F238E27FC236}">
+                <a16:creationId xmlns:a16="http://schemas.microsoft.com/office/drawing/2014/main" id="{A4065A48-B09A-F641-AB3A-CD12527A296B}"/>
+              </a:ext>
+            </a:extLst>
+          </p:cNvPr>
+          <p:cNvSpPr txBox="1"/>
+          <p:nvPr/>
+        </p:nvSpPr>
+        <p:spPr>
+          <a:xfrm>
+            <a:off x="551793" y="3578595"/>
+            <a:ext cx="8040414" cy="954107"/>
+          </a:xfrm>
+          <a:prstGeom prst="rect">
+            <a:avLst/>
+          </a:prstGeom>
+          <a:noFill/>
+        </p:spPr>
+        <p:txBody>
+          <a:bodyPr wrap="square" rtlCol="0">
+            <a:spAutoFit/>
+          </a:bodyPr>
+          <a:lstStyle/>
+          <a:p>
+            <a:r>
+              <a:rPr lang="en-US" sz="2800" dirty="0">
+                <a:latin typeface="Helvetica Light" panose="020B0403020202020204" pitchFamily="34" charset="0"/>
+              </a:rPr>
+              <a:t>Please fill out survey if you haven’t by the start of the class: </a:t>
+            </a:r>
+            <a:r>
+              <a:rPr lang="en-US" sz="2800" dirty="0">
+                <a:latin typeface="Helvetica Light" panose="020B0403020202020204" pitchFamily="34" charset="0"/>
+                <a:hlinkClick r:id="rId4"/>
+              </a:rPr>
+              <a:t>https://forms.gle/BsTuzKRdwufXfgor5</a:t>
+            </a:r>
+            <a:endParaRPr lang="en-US" sz="2800" dirty="0">
+              <a:latin typeface="Helvetica Light" panose="020B0403020202020204" pitchFamily="34" charset="0"/>
+            </a:endParaRPr>
           </a:p>
         </p:txBody>
       </p:sp>
     </p:spTree>
     <p:extLst>
       <p:ext uri="{BB962C8B-B14F-4D97-AF65-F5344CB8AC3E}">
-        <p14:creationId xmlns:p14="http://schemas.microsoft.com/office/powerpoint/2010/main" val="3508814034"/>
+        <p14:creationId xmlns:p14="http://schemas.microsoft.com/office/powerpoint/2010/main" val="3551967228"/>
       </p:ext>
     </p:extLst>
   </p:cSld>
@@ -3742,6 +3820,473 @@
             <p:ph type="title"/>
           </p:nvPr>
         </p:nvSpPr>
+        <p:spPr/>
+        <p:txBody>
+          <a:bodyPr/>
+          <a:lstStyle/>
+          <a:p>
+            <a:r>
+              <a:rPr lang="en-US" dirty="0"/>
+              <a:t>Introduction to control structures and indentation</a:t>
+            </a:r>
+          </a:p>
+        </p:txBody>
+      </p:sp>
+      <p:sp>
+        <p:nvSpPr>
+          <p:cNvPr id="4" name="TextBox 3">
+            <a:extLst>
+              <a:ext uri="{FF2B5EF4-FFF2-40B4-BE49-F238E27FC236}">
+                <a16:creationId xmlns:a16="http://schemas.microsoft.com/office/drawing/2014/main" id="{46248A77-B36C-D941-99FE-A27742D1BAD3}"/>
+              </a:ext>
+            </a:extLst>
+          </p:cNvPr>
+          <p:cNvSpPr txBox="1"/>
+          <p:nvPr/>
+        </p:nvSpPr>
+        <p:spPr>
+          <a:xfrm>
+            <a:off x="367862" y="1376148"/>
+            <a:ext cx="8040414" cy="954107"/>
+          </a:xfrm>
+          <a:prstGeom prst="rect">
+            <a:avLst/>
+          </a:prstGeom>
+          <a:noFill/>
+        </p:spPr>
+        <p:txBody>
+          <a:bodyPr wrap="square" rtlCol="0">
+            <a:spAutoFit/>
+          </a:bodyPr>
+          <a:lstStyle/>
+          <a:p>
+            <a:r>
+              <a:rPr lang="en-US" sz="2800" dirty="0">
+                <a:latin typeface="Helvetica Light" panose="020B0403020202020204" pitchFamily="34" charset="0"/>
+              </a:rPr>
+              <a:t>if statements allow decisions to be made based on the resultant values of conditionals</a:t>
+            </a:r>
+          </a:p>
+        </p:txBody>
+      </p:sp>
+      <p:sp>
+        <p:nvSpPr>
+          <p:cNvPr id="6" name="TextBox 5">
+            <a:extLst>
+              <a:ext uri="{FF2B5EF4-FFF2-40B4-BE49-F238E27FC236}">
+                <a16:creationId xmlns:a16="http://schemas.microsoft.com/office/drawing/2014/main" id="{C476E3F5-273D-FE4B-8977-896A1083CF41}"/>
+              </a:ext>
+            </a:extLst>
+          </p:cNvPr>
+          <p:cNvSpPr txBox="1"/>
+          <p:nvPr/>
+        </p:nvSpPr>
+        <p:spPr>
+          <a:xfrm>
+            <a:off x="367862" y="2535715"/>
+            <a:ext cx="4414346" cy="4185761"/>
+          </a:xfrm>
+          <a:prstGeom prst="rect">
+            <a:avLst/>
+          </a:prstGeom>
+          <a:noFill/>
+        </p:spPr>
+        <p:txBody>
+          <a:bodyPr wrap="square" rtlCol="0">
+            <a:spAutoFit/>
+          </a:bodyPr>
+          <a:lstStyle/>
+          <a:p>
+            <a:r>
+              <a:rPr lang="en-US" sz="1400" dirty="0">
+                <a:latin typeface="Courier New" panose="02070309020205020404" pitchFamily="49" charset="0"/>
+                <a:cs typeface="Courier New" panose="02070309020205020404" pitchFamily="49" charset="0"/>
+              </a:rPr>
+              <a:t>if 5 &gt; 2: #5 is greater than 2 so will execute statement within the if statement. Statements within the if statement are tabbed </a:t>
+            </a:r>
+          </a:p>
+          <a:p>
+            <a:r>
+              <a:rPr lang="en-US" sz="1400" dirty="0">
+                <a:latin typeface="Courier New" panose="02070309020205020404" pitchFamily="49" charset="0"/>
+                <a:cs typeface="Courier New" panose="02070309020205020404" pitchFamily="49" charset="0"/>
+              </a:rPr>
+              <a:t>...     print("this is always true")</a:t>
+            </a:r>
+          </a:p>
+          <a:p>
+            <a:r>
+              <a:rPr lang="en-US" sz="1400" dirty="0">
+                <a:latin typeface="Courier New" panose="02070309020205020404" pitchFamily="49" charset="0"/>
+                <a:cs typeface="Courier New" panose="02070309020205020404" pitchFamily="49" charset="0"/>
+              </a:rPr>
+              <a:t>... </a:t>
+            </a:r>
+          </a:p>
+          <a:p>
+            <a:r>
+              <a:rPr lang="en-US" sz="1400" dirty="0">
+                <a:latin typeface="Courier New" panose="02070309020205020404" pitchFamily="49" charset="0"/>
+                <a:cs typeface="Courier New" panose="02070309020205020404" pitchFamily="49" charset="0"/>
+              </a:rPr>
+              <a:t>this is always true</a:t>
+            </a:r>
+          </a:p>
+          <a:p>
+            <a:endParaRPr lang="en-US" sz="1400" dirty="0">
+              <a:latin typeface="Courier New" panose="02070309020205020404" pitchFamily="49" charset="0"/>
+              <a:cs typeface="Courier New" panose="02070309020205020404" pitchFamily="49" charset="0"/>
+            </a:endParaRPr>
+          </a:p>
+          <a:p>
+            <a:r>
+              <a:rPr lang="en-US" sz="1400" dirty="0">
+                <a:latin typeface="Courier New" panose="02070309020205020404" pitchFamily="49" charset="0"/>
+                <a:cs typeface="Courier New" panose="02070309020205020404" pitchFamily="49" charset="0"/>
+              </a:rPr>
+              <a:t>&gt;&gt;&gt;if 5 &gt; 2:</a:t>
+            </a:r>
+          </a:p>
+          <a:p>
+            <a:r>
+              <a:rPr lang="en-US" sz="1400" dirty="0">
+                <a:latin typeface="Courier New" panose="02070309020205020404" pitchFamily="49" charset="0"/>
+                <a:cs typeface="Courier New" panose="02070309020205020404" pitchFamily="49" charset="0"/>
+              </a:rPr>
+              <a:t>...print("wrong")</a:t>
+            </a:r>
+          </a:p>
+          <a:p>
+            <a:r>
+              <a:rPr lang="en-US" sz="1400" dirty="0">
+                <a:latin typeface="Courier New" panose="02070309020205020404" pitchFamily="49" charset="0"/>
+                <a:cs typeface="Courier New" panose="02070309020205020404" pitchFamily="49" charset="0"/>
+              </a:rPr>
+              <a:t>  File "&lt;stdin&gt;", line 2</a:t>
+            </a:r>
+          </a:p>
+          <a:p>
+            <a:r>
+              <a:rPr lang="en-US" sz="1400" dirty="0">
+                <a:latin typeface="Courier New" panose="02070309020205020404" pitchFamily="49" charset="0"/>
+                <a:cs typeface="Courier New" panose="02070309020205020404" pitchFamily="49" charset="0"/>
+              </a:rPr>
+              <a:t>    print("wrong")</a:t>
+            </a:r>
+          </a:p>
+          <a:p>
+            <a:r>
+              <a:rPr lang="en-US" sz="1400" dirty="0">
+                <a:latin typeface="Courier New" panose="02070309020205020404" pitchFamily="49" charset="0"/>
+                <a:cs typeface="Courier New" panose="02070309020205020404" pitchFamily="49" charset="0"/>
+              </a:rPr>
+              <a:t>        ^</a:t>
+            </a:r>
+          </a:p>
+          <a:p>
+            <a:r>
+              <a:rPr lang="en-US" sz="1400" dirty="0" err="1">
+                <a:latin typeface="Courier New" panose="02070309020205020404" pitchFamily="49" charset="0"/>
+                <a:cs typeface="Courier New" panose="02070309020205020404" pitchFamily="49" charset="0"/>
+              </a:rPr>
+              <a:t>IndentationError</a:t>
+            </a:r>
+            <a:r>
+              <a:rPr lang="en-US" sz="1400" dirty="0">
+                <a:latin typeface="Courier New" panose="02070309020205020404" pitchFamily="49" charset="0"/>
+                <a:cs typeface="Courier New" panose="02070309020205020404" pitchFamily="49" charset="0"/>
+              </a:rPr>
+              <a:t>: expected an indented block</a:t>
+            </a:r>
+          </a:p>
+          <a:p>
+            <a:endParaRPr lang="en-US" sz="1400" dirty="0">
+              <a:latin typeface="Courier New" panose="02070309020205020404" pitchFamily="49" charset="0"/>
+              <a:cs typeface="Courier New" panose="02070309020205020404" pitchFamily="49" charset="0"/>
+            </a:endParaRPr>
+          </a:p>
+          <a:p>
+            <a:r>
+              <a:rPr lang="en-US" sz="1400" dirty="0">
+                <a:latin typeface="Courier New" panose="02070309020205020404" pitchFamily="49" charset="0"/>
+                <a:cs typeface="Courier New" panose="02070309020205020404" pitchFamily="49" charset="0"/>
+              </a:rPr>
+              <a:t>&gt;&gt;&gt;if 5 &gt; 2:</a:t>
+            </a:r>
+          </a:p>
+          <a:p>
+            <a:r>
+              <a:rPr lang="en-US" sz="1400" dirty="0">
+                <a:latin typeface="Courier New" panose="02070309020205020404" pitchFamily="49" charset="0"/>
+                <a:cs typeface="Courier New" panose="02070309020205020404" pitchFamily="49" charset="0"/>
+              </a:rPr>
+              <a:t>...  print("correct tabbing")</a:t>
+            </a:r>
+          </a:p>
+          <a:p>
+            <a:r>
+              <a:rPr lang="en-US" sz="1400" dirty="0">
+                <a:latin typeface="Courier New" panose="02070309020205020404" pitchFamily="49" charset="0"/>
+                <a:cs typeface="Courier New" panose="02070309020205020404" pitchFamily="49" charset="0"/>
+              </a:rPr>
+              <a:t>correct tabbing</a:t>
+            </a:r>
+          </a:p>
+        </p:txBody>
+      </p:sp>
+      <p:sp>
+        <p:nvSpPr>
+          <p:cNvPr id="7" name="TextBox 6">
+            <a:extLst>
+              <a:ext uri="{FF2B5EF4-FFF2-40B4-BE49-F238E27FC236}">
+                <a16:creationId xmlns:a16="http://schemas.microsoft.com/office/drawing/2014/main" id="{0127582C-8F3D-6746-AA17-ACC9CC61EE9A}"/>
+              </a:ext>
+            </a:extLst>
+          </p:cNvPr>
+          <p:cNvSpPr txBox="1"/>
+          <p:nvPr/>
+        </p:nvSpPr>
+        <p:spPr>
+          <a:xfrm>
+            <a:off x="4729654" y="2427992"/>
+            <a:ext cx="4414346" cy="4401205"/>
+          </a:xfrm>
+          <a:prstGeom prst="rect">
+            <a:avLst/>
+          </a:prstGeom>
+          <a:noFill/>
+        </p:spPr>
+        <p:txBody>
+          <a:bodyPr wrap="square" rtlCol="0">
+            <a:spAutoFit/>
+          </a:bodyPr>
+          <a:lstStyle/>
+          <a:p>
+            <a:r>
+              <a:rPr lang="en-US" sz="1400" dirty="0">
+                <a:latin typeface="Courier New" panose="02070309020205020404" pitchFamily="49" charset="0"/>
+                <a:cs typeface="Courier New" panose="02070309020205020404" pitchFamily="49" charset="0"/>
+              </a:rPr>
+              <a:t># if statements can be paired with else statements, </a:t>
+            </a:r>
+          </a:p>
+          <a:p>
+            <a:r>
+              <a:rPr lang="en-US" sz="1400" dirty="0">
+                <a:latin typeface="Courier New" panose="02070309020205020404" pitchFamily="49" charset="0"/>
+                <a:cs typeface="Courier New" panose="02070309020205020404" pitchFamily="49" charset="0"/>
+              </a:rPr>
+              <a:t>&gt;&gt;&gt;if 2 &gt; 5:</a:t>
+            </a:r>
+          </a:p>
+          <a:p>
+            <a:r>
+              <a:rPr lang="en-US" sz="1400" dirty="0">
+                <a:latin typeface="Courier New" panose="02070309020205020404" pitchFamily="49" charset="0"/>
+                <a:cs typeface="Courier New" panose="02070309020205020404" pitchFamily="49" charset="0"/>
+              </a:rPr>
+              <a:t>...   print("will not execute")</a:t>
+            </a:r>
+          </a:p>
+          <a:p>
+            <a:r>
+              <a:rPr lang="en-US" sz="1400" dirty="0">
+                <a:latin typeface="Courier New" panose="02070309020205020404" pitchFamily="49" charset="0"/>
+                <a:cs typeface="Courier New" panose="02070309020205020404" pitchFamily="49" charset="0"/>
+              </a:rPr>
+              <a:t>...else:</a:t>
+            </a:r>
+          </a:p>
+          <a:p>
+            <a:r>
+              <a:rPr lang="en-US" sz="1400" dirty="0">
+                <a:latin typeface="Courier New" panose="02070309020205020404" pitchFamily="49" charset="0"/>
+                <a:cs typeface="Courier New" panose="02070309020205020404" pitchFamily="49" charset="0"/>
+              </a:rPr>
+              <a:t>...   print("will execute")</a:t>
+            </a:r>
+          </a:p>
+          <a:p>
+            <a:r>
+              <a:rPr lang="en-US" sz="1400" dirty="0">
+                <a:latin typeface="Courier New" panose="02070309020205020404" pitchFamily="49" charset="0"/>
+                <a:cs typeface="Courier New" panose="02070309020205020404" pitchFamily="49" charset="0"/>
+              </a:rPr>
+              <a:t>...</a:t>
+            </a:r>
+          </a:p>
+          <a:p>
+            <a:r>
+              <a:rPr lang="en-US" sz="1400" dirty="0">
+                <a:latin typeface="Courier New" panose="02070309020205020404" pitchFamily="49" charset="0"/>
+                <a:cs typeface="Courier New" panose="02070309020205020404" pitchFamily="49" charset="0"/>
+              </a:rPr>
+              <a:t>will execute</a:t>
+            </a:r>
+          </a:p>
+          <a:p>
+            <a:endParaRPr lang="en-US" sz="1400" dirty="0">
+              <a:latin typeface="Courier New" panose="02070309020205020404" pitchFamily="49" charset="0"/>
+              <a:cs typeface="Courier New" panose="02070309020205020404" pitchFamily="49" charset="0"/>
+            </a:endParaRPr>
+          </a:p>
+          <a:p>
+            <a:r>
+              <a:rPr lang="en-US" sz="1400" dirty="0">
+                <a:latin typeface="Courier New" panose="02070309020205020404" pitchFamily="49" charset="0"/>
+                <a:cs typeface="Courier New" panose="02070309020205020404" pitchFamily="49" charset="0"/>
+              </a:rPr>
+              <a:t># if statements can also include </a:t>
+            </a:r>
+            <a:r>
+              <a:rPr lang="en-US" sz="1400" dirty="0" err="1">
+                <a:latin typeface="Courier New" panose="02070309020205020404" pitchFamily="49" charset="0"/>
+                <a:cs typeface="Courier New" panose="02070309020205020404" pitchFamily="49" charset="0"/>
+              </a:rPr>
+              <a:t>elif</a:t>
+            </a:r>
+            <a:r>
+              <a:rPr lang="en-US" sz="1400" dirty="0">
+                <a:latin typeface="Courier New" panose="02070309020205020404" pitchFamily="49" charset="0"/>
+                <a:cs typeface="Courier New" panose="02070309020205020404" pitchFamily="49" charset="0"/>
+              </a:rPr>
+              <a:t> statements which are a combination of a if and else statement.</a:t>
+            </a:r>
+          </a:p>
+          <a:p>
+            <a:r>
+              <a:rPr lang="en-US" sz="1400" dirty="0">
+                <a:latin typeface="Courier New" panose="02070309020205020404" pitchFamily="49" charset="0"/>
+                <a:cs typeface="Courier New" panose="02070309020205020404" pitchFamily="49" charset="0"/>
+              </a:rPr>
+              <a:t>&gt;&gt;&gt;num = 5</a:t>
+            </a:r>
+          </a:p>
+          <a:p>
+            <a:r>
+              <a:rPr lang="en-US" sz="1400" dirty="0">
+                <a:latin typeface="Courier New" panose="02070309020205020404" pitchFamily="49" charset="0"/>
+                <a:cs typeface="Courier New" panose="02070309020205020404" pitchFamily="49" charset="0"/>
+              </a:rPr>
+              <a:t>&gt;&gt;&gt;if num == 4:</a:t>
+            </a:r>
+          </a:p>
+          <a:p>
+            <a:r>
+              <a:rPr lang="en-US" sz="1400" dirty="0">
+                <a:latin typeface="Courier New" panose="02070309020205020404" pitchFamily="49" charset="0"/>
+                <a:cs typeface="Courier New" panose="02070309020205020404" pitchFamily="49" charset="0"/>
+              </a:rPr>
+              <a:t>...  print("num is 4")</a:t>
+            </a:r>
+          </a:p>
+          <a:p>
+            <a:r>
+              <a:rPr lang="en-US" sz="1400" dirty="0">
+                <a:latin typeface="Courier New" panose="02070309020205020404" pitchFamily="49" charset="0"/>
+                <a:cs typeface="Courier New" panose="02070309020205020404" pitchFamily="49" charset="0"/>
+              </a:rPr>
+              <a:t>...</a:t>
+            </a:r>
+            <a:r>
+              <a:rPr lang="en-US" sz="1400" dirty="0" err="1">
+                <a:latin typeface="Courier New" panose="02070309020205020404" pitchFamily="49" charset="0"/>
+                <a:cs typeface="Courier New" panose="02070309020205020404" pitchFamily="49" charset="0"/>
+              </a:rPr>
+              <a:t>elif</a:t>
+            </a:r>
+            <a:r>
+              <a:rPr lang="en-US" sz="1400" dirty="0">
+                <a:latin typeface="Courier New" panose="02070309020205020404" pitchFamily="49" charset="0"/>
+                <a:cs typeface="Courier New" panose="02070309020205020404" pitchFamily="49" charset="0"/>
+              </a:rPr>
+              <a:t> num == 5:</a:t>
+            </a:r>
+          </a:p>
+          <a:p>
+            <a:r>
+              <a:rPr lang="en-US" sz="1400" dirty="0">
+                <a:latin typeface="Courier New" panose="02070309020205020404" pitchFamily="49" charset="0"/>
+                <a:cs typeface="Courier New" panose="02070309020205020404" pitchFamily="49" charset="0"/>
+              </a:rPr>
+              <a:t>...  print("num is 5")</a:t>
+            </a:r>
+          </a:p>
+          <a:p>
+            <a:r>
+              <a:rPr lang="en-US" sz="1400" dirty="0">
+                <a:latin typeface="Courier New" panose="02070309020205020404" pitchFamily="49" charset="0"/>
+                <a:cs typeface="Courier New" panose="02070309020205020404" pitchFamily="49" charset="0"/>
+              </a:rPr>
+              <a:t>...else:</a:t>
+            </a:r>
+          </a:p>
+          <a:p>
+            <a:r>
+              <a:rPr lang="en-US" sz="1400" dirty="0">
+                <a:latin typeface="Courier New" panose="02070309020205020404" pitchFamily="49" charset="0"/>
+                <a:cs typeface="Courier New" panose="02070309020205020404" pitchFamily="49" charset="0"/>
+              </a:rPr>
+              <a:t>...  print("num is something else")</a:t>
+            </a:r>
+          </a:p>
+          <a:p>
+            <a:r>
+              <a:rPr lang="en-US" sz="1400" dirty="0">
+                <a:latin typeface="Courier New" panose="02070309020205020404" pitchFamily="49" charset="0"/>
+                <a:cs typeface="Courier New" panose="02070309020205020404" pitchFamily="49" charset="0"/>
+              </a:rPr>
+              <a:t>num is 5</a:t>
+            </a:r>
+          </a:p>
+        </p:txBody>
+      </p:sp>
+    </p:spTree>
+    <p:extLst>
+      <p:ext uri="{BB962C8B-B14F-4D97-AF65-F5344CB8AC3E}">
+        <p14:creationId xmlns:p14="http://schemas.microsoft.com/office/powerpoint/2010/main" val="1879729444"/>
+      </p:ext>
+    </p:extLst>
+  </p:cSld>
+  <p:clrMapOvr>
+    <a:masterClrMapping/>
+  </p:clrMapOvr>
+</p:sld>
+</file>
+
+<file path=ppt/slides/slide11.xml><?xml version="1.0" encoding="utf-8"?>
+<p:sld xmlns:a="http://schemas.openxmlformats.org/drawingml/2006/main" xmlns:r="http://schemas.openxmlformats.org/officeDocument/2006/relationships" xmlns:p="http://schemas.openxmlformats.org/presentationml/2006/main">
+  <p:cSld>
+    <p:spTree>
+      <p:nvGrpSpPr>
+        <p:cNvPr id="1" name=""/>
+        <p:cNvGrpSpPr/>
+        <p:nvPr/>
+      </p:nvGrpSpPr>
+      <p:grpSpPr>
+        <a:xfrm>
+          <a:off x="0" y="0"/>
+          <a:ext cx="0" cy="0"/>
+          <a:chOff x="0" y="0"/>
+          <a:chExt cx="0" cy="0"/>
+        </a:xfrm>
+      </p:grpSpPr>
+      <p:sp>
+        <p:nvSpPr>
+          <p:cNvPr id="2" name="Title 1">
+            <a:extLst>
+              <a:ext uri="{FF2B5EF4-FFF2-40B4-BE49-F238E27FC236}">
+                <a16:creationId xmlns:a16="http://schemas.microsoft.com/office/drawing/2014/main" id="{F889A6B4-ABC8-164D-A645-842681269F09}"/>
+              </a:ext>
+            </a:extLst>
+          </p:cNvPr>
+          <p:cNvSpPr>
+            <a:spLocks noGrp="1"/>
+          </p:cNvSpPr>
+          <p:nvPr>
+            <p:ph type="title"/>
+          </p:nvPr>
+        </p:nvSpPr>
         <p:spPr>
           <a:xfrm>
             <a:off x="628650" y="136524"/>
@@ -3881,7 +4426,7 @@
 </p:sld>
 </file>
 
-<file path=ppt/slides/slide11.xml><?xml version="1.0" encoding="utf-8"?>
+<file path=ppt/slides/slide12.xml><?xml version="1.0" encoding="utf-8"?>
 <p:sld xmlns:a="http://schemas.openxmlformats.org/drawingml/2006/main" xmlns:r="http://schemas.openxmlformats.org/officeDocument/2006/relationships" xmlns:p="http://schemas.openxmlformats.org/presentationml/2006/main">
   <p:cSld>
     <p:spTree>
@@ -4000,10 +4545,10 @@
       </p:grpSpPr>
       <p:sp>
         <p:nvSpPr>
-          <p:cNvPr id="4" name="Title 1">
+          <p:cNvPr id="2" name="Title 1">
             <a:extLst>
               <a:ext uri="{FF2B5EF4-FFF2-40B4-BE49-F238E27FC236}">
-                <a16:creationId xmlns:a16="http://schemas.microsoft.com/office/drawing/2014/main" id="{66B246B7-2C24-FE41-B43D-32A0095DEE6A}"/>
+                <a16:creationId xmlns:a16="http://schemas.microsoft.com/office/drawing/2014/main" id="{7F787123-B70F-0249-8261-D5528BA0FF06}"/>
               </a:ext>
             </a:extLst>
           </p:cNvPr>
@@ -4011,13 +4556,13 @@
             <a:spLocks noGrp="1"/>
           </p:cNvSpPr>
           <p:nvPr>
-            <p:ph type="title"/>
-          </p:nvPr>
-        </p:nvSpPr>
-        <p:spPr>
-          <a:xfrm>
-            <a:off x="628650" y="136524"/>
-            <a:ext cx="7886700" cy="1325563"/>
+            <p:ph type="ctrTitle"/>
+          </p:nvPr>
+        </p:nvSpPr>
+        <p:spPr>
+          <a:xfrm>
+            <a:off x="1143000" y="1699022"/>
+            <a:ext cx="6858000" cy="1790700"/>
           </a:xfrm>
         </p:spPr>
         <p:txBody>
@@ -4026,135 +4571,40 @@
           <a:p>
             <a:r>
               <a:rPr lang="en-US" dirty="0"/>
-              <a:t>How to run python</a:t>
-            </a:r>
-          </a:p>
-        </p:txBody>
-      </p:sp>
-      <p:sp>
-        <p:nvSpPr>
-          <p:cNvPr id="5" name="TextBox 4">
+              <a:t>How to python and variable types</a:t>
+            </a:r>
+          </a:p>
+        </p:txBody>
+      </p:sp>
+      <p:sp>
+        <p:nvSpPr>
+          <p:cNvPr id="3" name="Subtitle 2">
             <a:extLst>
               <a:ext uri="{FF2B5EF4-FFF2-40B4-BE49-F238E27FC236}">
-                <a16:creationId xmlns:a16="http://schemas.microsoft.com/office/drawing/2014/main" id="{8001F101-DFD0-A949-A2A0-87E043A2D9B5}"/>
+                <a16:creationId xmlns:a16="http://schemas.microsoft.com/office/drawing/2014/main" id="{BE2283A0-D14E-8A47-A1EF-DF1C981E4DBA}"/>
               </a:ext>
             </a:extLst>
           </p:cNvPr>
-          <p:cNvSpPr txBox="1"/>
-          <p:nvPr/>
-        </p:nvSpPr>
-        <p:spPr>
-          <a:xfrm>
-            <a:off x="378372" y="1462087"/>
-            <a:ext cx="8040414" cy="523220"/>
-          </a:xfrm>
-          <a:prstGeom prst="rect">
-            <a:avLst/>
-          </a:prstGeom>
-          <a:noFill/>
-        </p:spPr>
-        <p:txBody>
-          <a:bodyPr wrap="square" rtlCol="0">
-            <a:spAutoFit/>
-          </a:bodyPr>
-          <a:lstStyle/>
-          <a:p>
-            <a:r>
-              <a:rPr lang="en-US" sz="2800" dirty="0">
-                <a:latin typeface="Helvetica Light" panose="020B0403020202020204" pitchFamily="34" charset="0"/>
-              </a:rPr>
-              <a:t>Option 1: Use the command line interpreter   </a:t>
-            </a:r>
-          </a:p>
-        </p:txBody>
-      </p:sp>
-      <p:sp>
-        <p:nvSpPr>
-          <p:cNvPr id="6" name="TextBox 5">
-            <a:extLst>
-              <a:ext uri="{FF2B5EF4-FFF2-40B4-BE49-F238E27FC236}">
-                <a16:creationId xmlns:a16="http://schemas.microsoft.com/office/drawing/2014/main" id="{25EC8EC7-8616-3049-83F9-EF61DD4D4292}"/>
-              </a:ext>
-            </a:extLst>
-          </p:cNvPr>
-          <p:cNvSpPr txBox="1"/>
-          <p:nvPr/>
-        </p:nvSpPr>
-        <p:spPr>
-          <a:xfrm>
-            <a:off x="378372" y="2287370"/>
-            <a:ext cx="8040414" cy="3539430"/>
-          </a:xfrm>
-          <a:prstGeom prst="rect">
-            <a:avLst/>
-          </a:prstGeom>
-          <a:noFill/>
-        </p:spPr>
-        <p:txBody>
-          <a:bodyPr wrap="square" rtlCol="0">
-            <a:spAutoFit/>
-          </a:bodyPr>
-          <a:lstStyle/>
-          <a:p>
-            <a:r>
-              <a:rPr lang="en-US" sz="2800" dirty="0">
-                <a:latin typeface="Courier New" panose="02070309020205020404" pitchFamily="49" charset="0"/>
-                <a:cs typeface="Courier New" panose="02070309020205020404" pitchFamily="49" charset="0"/>
-              </a:rPr>
-              <a:t>$ python</a:t>
-            </a:r>
-          </a:p>
-          <a:p>
-            <a:r>
-              <a:rPr lang="en-US" sz="2800" dirty="0">
-                <a:latin typeface="Courier New" panose="02070309020205020404" pitchFamily="49" charset="0"/>
-                <a:cs typeface="Courier New" panose="02070309020205020404" pitchFamily="49" charset="0"/>
-              </a:rPr>
-              <a:t>&gt;&gt;&gt; print(“hello world”) </a:t>
-            </a:r>
-          </a:p>
-          <a:p>
-            <a:r>
-              <a:rPr lang="en-US" sz="2800" dirty="0">
-                <a:latin typeface="Courier New" panose="02070309020205020404" pitchFamily="49" charset="0"/>
-                <a:cs typeface="Courier New" panose="02070309020205020404" pitchFamily="49" charset="0"/>
-              </a:rPr>
-              <a:t>“hello world”</a:t>
-            </a:r>
-          </a:p>
-          <a:p>
-            <a:r>
-              <a:rPr lang="en-US" sz="2800" dirty="0">
-                <a:latin typeface="Courier New" panose="02070309020205020404" pitchFamily="49" charset="0"/>
-                <a:cs typeface="Courier New" panose="02070309020205020404" pitchFamily="49" charset="0"/>
-              </a:rPr>
-              <a:t>&gt;&gt;&gt; # this is a comment, python ignores these</a:t>
-            </a:r>
-          </a:p>
-          <a:p>
-            <a:r>
-              <a:rPr lang="en-US" sz="2800" dirty="0">
-                <a:latin typeface="Courier New" panose="02070309020205020404" pitchFamily="49" charset="0"/>
-                <a:cs typeface="Courier New" panose="02070309020205020404" pitchFamily="49" charset="0"/>
-              </a:rPr>
-              <a:t>...</a:t>
-            </a:r>
-          </a:p>
-          <a:p>
-            <a:r>
-              <a:rPr lang="en-US" sz="2800" dirty="0">
-                <a:latin typeface="Courier New" panose="02070309020205020404" pitchFamily="49" charset="0"/>
-                <a:cs typeface="Courier New" panose="02070309020205020404" pitchFamily="49" charset="0"/>
-              </a:rPr>
-              <a:t>&gt;&gt;&gt; exit() # how you leave the interpreter</a:t>
-            </a:r>
+          <p:cNvSpPr>
+            <a:spLocks noGrp="1"/>
+          </p:cNvSpPr>
+          <p:nvPr>
+            <p:ph type="subTitle" idx="1"/>
+          </p:nvPr>
+        </p:nvSpPr>
+        <p:spPr/>
+        <p:txBody>
+          <a:bodyPr/>
+          <a:lstStyle/>
+          <a:p>
+            <a:endParaRPr lang="en-US"/>
           </a:p>
         </p:txBody>
       </p:sp>
     </p:spTree>
     <p:extLst>
       <p:ext uri="{BB962C8B-B14F-4D97-AF65-F5344CB8AC3E}">
-        <p14:creationId xmlns:p14="http://schemas.microsoft.com/office/powerpoint/2010/main" val="2833682259"/>
+        <p14:creationId xmlns:p14="http://schemas.microsoft.com/office/powerpoint/2010/main" val="3508814034"/>
       </p:ext>
     </p:extLst>
   </p:cSld>
@@ -4183,10 +4633,10 @@
       </p:grpSpPr>
       <p:sp>
         <p:nvSpPr>
-          <p:cNvPr id="5" name="Title 1">
+          <p:cNvPr id="4" name="Title 1">
             <a:extLst>
               <a:ext uri="{FF2B5EF4-FFF2-40B4-BE49-F238E27FC236}">
-                <a16:creationId xmlns:a16="http://schemas.microsoft.com/office/drawing/2014/main" id="{616229D4-5978-FD4A-9D4F-C9060F17F41F}"/>
+                <a16:creationId xmlns:a16="http://schemas.microsoft.com/office/drawing/2014/main" id="{66B246B7-2C24-FE41-B43D-32A0095DEE6A}"/>
               </a:ext>
             </a:extLst>
           </p:cNvPr>
@@ -4216,10 +4666,10 @@
       </p:sp>
       <p:sp>
         <p:nvSpPr>
-          <p:cNvPr id="6" name="TextBox 5">
+          <p:cNvPr id="5" name="TextBox 4">
             <a:extLst>
               <a:ext uri="{FF2B5EF4-FFF2-40B4-BE49-F238E27FC236}">
-                <a16:creationId xmlns:a16="http://schemas.microsoft.com/office/drawing/2014/main" id="{4FF8CE93-C196-2A49-B984-463F6CEC34E5}"/>
+                <a16:creationId xmlns:a16="http://schemas.microsoft.com/office/drawing/2014/main" id="{8001F101-DFD0-A949-A2A0-87E043A2D9B5}"/>
               </a:ext>
             </a:extLst>
           </p:cNvPr>
@@ -4229,7 +4679,7 @@
         <p:spPr>
           <a:xfrm>
             <a:off x="378372" y="1462087"/>
-            <a:ext cx="8040414" cy="1384995"/>
+            <a:ext cx="8040414" cy="523220"/>
           </a:xfrm>
           <a:prstGeom prst="rect">
             <a:avLst/>
@@ -4246,37 +4696,17 @@
               <a:rPr lang="en-US" sz="2800" dirty="0">
                 <a:latin typeface="Helvetica Light" panose="020B0403020202020204" pitchFamily="34" charset="0"/>
               </a:rPr>
-              <a:t>Option 2: execute a script, always have the extension of your script be ".</a:t>
-            </a:r>
-            <a:r>
-              <a:rPr lang="en-US" sz="2800" dirty="0" err="1">
-                <a:latin typeface="Helvetica Light" panose="020B0403020202020204" pitchFamily="34" charset="0"/>
-              </a:rPr>
-              <a:t>py</a:t>
-            </a:r>
-            <a:r>
-              <a:rPr lang="en-US" sz="2800" dirty="0">
-                <a:latin typeface="Helvetica Light" panose="020B0403020202020204" pitchFamily="34" charset="0"/>
-              </a:rPr>
-              <a:t>"</a:t>
-            </a:r>
-          </a:p>
-          <a:p>
-            <a:r>
-              <a:rPr lang="en-US" sz="2800" dirty="0">
-                <a:latin typeface="Helvetica Light" panose="020B0403020202020204" pitchFamily="34" charset="0"/>
-              </a:rPr>
-              <a:t> </a:t>
-            </a:r>
-          </a:p>
-        </p:txBody>
-      </p:sp>
-      <p:sp>
-        <p:nvSpPr>
-          <p:cNvPr id="7" name="TextBox 6">
+              <a:t>Option 1: Use the command line interpreter   </a:t>
+            </a:r>
+          </a:p>
+        </p:txBody>
+      </p:sp>
+      <p:sp>
+        <p:nvSpPr>
+          <p:cNvPr id="6" name="TextBox 5">
             <a:extLst>
               <a:ext uri="{FF2B5EF4-FFF2-40B4-BE49-F238E27FC236}">
-                <a16:creationId xmlns:a16="http://schemas.microsoft.com/office/drawing/2014/main" id="{DA9B7BE1-5051-4D4B-883A-7E8272D46FD9}"/>
+                <a16:creationId xmlns:a16="http://schemas.microsoft.com/office/drawing/2014/main" id="{25EC8EC7-8616-3049-83F9-EF61DD4D4292}"/>
               </a:ext>
             </a:extLst>
           </p:cNvPr>
@@ -4285,8 +4715,8 @@
         </p:nvSpPr>
         <p:spPr>
           <a:xfrm>
-            <a:off x="378372" y="2655232"/>
-            <a:ext cx="8040414" cy="2246769"/>
+            <a:off x="378372" y="2287370"/>
+            <a:ext cx="8040414" cy="3539430"/>
           </a:xfrm>
           <a:prstGeom prst="rect">
             <a:avLst/>
@@ -4304,34 +4734,34 @@
                 <a:latin typeface="Courier New" panose="02070309020205020404" pitchFamily="49" charset="0"/>
                 <a:cs typeface="Courier New" panose="02070309020205020404" pitchFamily="49" charset="0"/>
               </a:rPr>
-              <a:t>$ cat </a:t>
-            </a:r>
-            <a:r>
-              <a:rPr lang="en-US" sz="2800" dirty="0" err="1">
-                <a:latin typeface="Courier New" panose="02070309020205020404" pitchFamily="49" charset="0"/>
-                <a:cs typeface="Courier New" panose="02070309020205020404" pitchFamily="49" charset="0"/>
-              </a:rPr>
-              <a:t>test.py</a:t>
-            </a:r>
+              <a:t>$ python</a:t>
+            </a:r>
+          </a:p>
+          <a:p>
             <a:r>
               <a:rPr lang="en-US" sz="2800" dirty="0">
                 <a:latin typeface="Courier New" panose="02070309020205020404" pitchFamily="49" charset="0"/>
                 <a:cs typeface="Courier New" panose="02070309020205020404" pitchFamily="49" charset="0"/>
               </a:rPr>
-              <a:t> </a:t>
-            </a:r>
-            <a:br>
+              <a:t>&gt;&gt;&gt; print(“hello world”) </a:t>
+            </a:r>
+          </a:p>
+          <a:p>
+            <a:r>
               <a:rPr lang="en-US" sz="2800" dirty="0">
                 <a:latin typeface="Courier New" panose="02070309020205020404" pitchFamily="49" charset="0"/>
                 <a:cs typeface="Courier New" panose="02070309020205020404" pitchFamily="49" charset="0"/>
               </a:rPr>
-            </a:br>
+              <a:t>“hello world”</a:t>
+            </a:r>
+          </a:p>
+          <a:p>
             <a:r>
               <a:rPr lang="en-US" sz="2800" dirty="0">
                 <a:latin typeface="Courier New" panose="02070309020205020404" pitchFamily="49" charset="0"/>
                 <a:cs typeface="Courier New" panose="02070309020205020404" pitchFamily="49" charset="0"/>
               </a:rPr>
-              <a:t>print(“hello world”)</a:t>
+              <a:t>&gt;&gt;&gt; # this is a comment, python ignores these</a:t>
             </a:r>
           </a:p>
           <a:p>
@@ -4340,44 +4770,24 @@
                 <a:latin typeface="Courier New" panose="02070309020205020404" pitchFamily="49" charset="0"/>
                 <a:cs typeface="Courier New" panose="02070309020205020404" pitchFamily="49" charset="0"/>
               </a:rPr>
-              <a:t>$ python </a:t>
-            </a:r>
-            <a:r>
-              <a:rPr lang="en-US" sz="2800" dirty="0" err="1">
-                <a:latin typeface="Courier New" panose="02070309020205020404" pitchFamily="49" charset="0"/>
-                <a:cs typeface="Courier New" panose="02070309020205020404" pitchFamily="49" charset="0"/>
-              </a:rPr>
-              <a:t>test.py</a:t>
-            </a:r>
+              <a:t>...</a:t>
+            </a:r>
+          </a:p>
+          <a:p>
             <a:r>
               <a:rPr lang="en-US" sz="2800" dirty="0">
                 <a:latin typeface="Courier New" panose="02070309020205020404" pitchFamily="49" charset="0"/>
                 <a:cs typeface="Courier New" panose="02070309020205020404" pitchFamily="49" charset="0"/>
               </a:rPr>
-              <a:t> </a:t>
-            </a:r>
-          </a:p>
-          <a:p>
-            <a:r>
-              <a:rPr lang="en-US" sz="2800" dirty="0">
-                <a:latin typeface="Courier New" panose="02070309020205020404" pitchFamily="49" charset="0"/>
-                <a:cs typeface="Courier New" panose="02070309020205020404" pitchFamily="49" charset="0"/>
-              </a:rPr>
-              <a:t>hello world</a:t>
-            </a:r>
-          </a:p>
-          <a:p>
-            <a:endParaRPr lang="en-US" sz="2800" dirty="0">
-              <a:latin typeface="Courier New" panose="02070309020205020404" pitchFamily="49" charset="0"/>
-              <a:cs typeface="Courier New" panose="02070309020205020404" pitchFamily="49" charset="0"/>
-            </a:endParaRPr>
+              <a:t>&gt;&gt;&gt; exit() # how you leave the interpreter</a:t>
+            </a:r>
           </a:p>
         </p:txBody>
       </p:sp>
     </p:spTree>
     <p:extLst>
       <p:ext uri="{BB962C8B-B14F-4D97-AF65-F5344CB8AC3E}">
-        <p14:creationId xmlns:p14="http://schemas.microsoft.com/office/powerpoint/2010/main" val="764925536"/>
+        <p14:creationId xmlns:p14="http://schemas.microsoft.com/office/powerpoint/2010/main" val="2833682259"/>
       </p:ext>
     </p:extLst>
   </p:cSld>
@@ -4406,10 +4816,10 @@
       </p:grpSpPr>
       <p:sp>
         <p:nvSpPr>
-          <p:cNvPr id="4" name="Title 1">
+          <p:cNvPr id="5" name="Title 1">
             <a:extLst>
               <a:ext uri="{FF2B5EF4-FFF2-40B4-BE49-F238E27FC236}">
-                <a16:creationId xmlns:a16="http://schemas.microsoft.com/office/drawing/2014/main" id="{49CEAF47-07B0-1141-8746-222823DB5A0A}"/>
+                <a16:creationId xmlns:a16="http://schemas.microsoft.com/office/drawing/2014/main" id="{616229D4-5978-FD4A-9D4F-C9060F17F41F}"/>
               </a:ext>
             </a:extLst>
           </p:cNvPr>
@@ -4432,17 +4842,17 @@
           <a:p>
             <a:r>
               <a:rPr lang="en-US" dirty="0"/>
-              <a:t>Variable types</a:t>
-            </a:r>
-          </a:p>
-        </p:txBody>
-      </p:sp>
-      <p:sp>
-        <p:nvSpPr>
-          <p:cNvPr id="5" name="TextBox 4">
+              <a:t>How to run python</a:t>
+            </a:r>
+          </a:p>
+        </p:txBody>
+      </p:sp>
+      <p:sp>
+        <p:nvSpPr>
+          <p:cNvPr id="6" name="TextBox 5">
             <a:extLst>
               <a:ext uri="{FF2B5EF4-FFF2-40B4-BE49-F238E27FC236}">
-                <a16:creationId xmlns:a16="http://schemas.microsoft.com/office/drawing/2014/main" id="{4CCB6D70-3ED1-E54A-8756-59E3D01E88D4}"/>
+                <a16:creationId xmlns:a16="http://schemas.microsoft.com/office/drawing/2014/main" id="{4FF8CE93-C196-2A49-B984-463F6CEC34E5}"/>
               </a:ext>
             </a:extLst>
           </p:cNvPr>
@@ -4452,7 +4862,7 @@
         <p:spPr>
           <a:xfrm>
             <a:off x="378372" y="1462087"/>
-            <a:ext cx="8040414" cy="3539430"/>
+            <a:ext cx="8040414" cy="1384995"/>
           </a:xfrm>
           <a:prstGeom prst="rect">
             <a:avLst/>
@@ -4469,20 +4879,19 @@
               <a:rPr lang="en-US" sz="2800" dirty="0">
                 <a:latin typeface="Helvetica Light" panose="020B0403020202020204" pitchFamily="34" charset="0"/>
               </a:rPr>
-              <a:t>Numbers: 2, 3.14, 94504050</a:t>
-            </a:r>
-          </a:p>
-          <a:p>
-            <a:endParaRPr lang="en-US" sz="2800" dirty="0">
-              <a:latin typeface="Helvetica Light" panose="020B0403020202020204" pitchFamily="34" charset="0"/>
-            </a:endParaRPr>
-          </a:p>
-          <a:p>
+              <a:t>Option 2: execute a script, always have the extension of your script be ".</a:t>
+            </a:r>
+            <a:r>
+              <a:rPr lang="en-US" sz="2800" dirty="0" err="1">
+                <a:latin typeface="Helvetica Light" panose="020B0403020202020204" pitchFamily="34" charset="0"/>
+              </a:rPr>
+              <a:t>py</a:t>
+            </a:r>
             <a:r>
               <a:rPr lang="en-US" sz="2800" dirty="0">
                 <a:latin typeface="Helvetica Light" panose="020B0403020202020204" pitchFamily="34" charset="0"/>
               </a:rPr>
-              <a:t>Strings: “hello”, ‘100’, “““ this </a:t>
+              <a:t>"</a:t>
             </a:r>
           </a:p>
           <a:p>
@@ -4490,41 +4899,118 @@
               <a:rPr lang="en-US" sz="2800" dirty="0">
                 <a:latin typeface="Helvetica Light" panose="020B0403020202020204" pitchFamily="34" charset="0"/>
               </a:rPr>
-              <a:t>string has multiple lines”””</a:t>
+              <a:t> </a:t>
+            </a:r>
+          </a:p>
+        </p:txBody>
+      </p:sp>
+      <p:sp>
+        <p:nvSpPr>
+          <p:cNvPr id="7" name="TextBox 6">
+            <a:extLst>
+              <a:ext uri="{FF2B5EF4-FFF2-40B4-BE49-F238E27FC236}">
+                <a16:creationId xmlns:a16="http://schemas.microsoft.com/office/drawing/2014/main" id="{DA9B7BE1-5051-4D4B-883A-7E8272D46FD9}"/>
+              </a:ext>
+            </a:extLst>
+          </p:cNvPr>
+          <p:cNvSpPr txBox="1"/>
+          <p:nvPr/>
+        </p:nvSpPr>
+        <p:spPr>
+          <a:xfrm>
+            <a:off x="378372" y="2655232"/>
+            <a:ext cx="8040414" cy="2246769"/>
+          </a:xfrm>
+          <a:prstGeom prst="rect">
+            <a:avLst/>
+          </a:prstGeom>
+          <a:noFill/>
+        </p:spPr>
+        <p:txBody>
+          <a:bodyPr wrap="square" rtlCol="0">
+            <a:spAutoFit/>
+          </a:bodyPr>
+          <a:lstStyle/>
+          <a:p>
+            <a:r>
+              <a:rPr lang="en-US" sz="2800" dirty="0">
+                <a:latin typeface="Courier New" panose="02070309020205020404" pitchFamily="49" charset="0"/>
+                <a:cs typeface="Courier New" panose="02070309020205020404" pitchFamily="49" charset="0"/>
+              </a:rPr>
+              <a:t>$ cat </a:t>
+            </a:r>
+            <a:r>
+              <a:rPr lang="en-US" sz="2800" dirty="0" err="1">
+                <a:latin typeface="Courier New" panose="02070309020205020404" pitchFamily="49" charset="0"/>
+                <a:cs typeface="Courier New" panose="02070309020205020404" pitchFamily="49" charset="0"/>
+              </a:rPr>
+              <a:t>test.py</a:t>
+            </a:r>
+            <a:r>
+              <a:rPr lang="en-US" sz="2800" dirty="0">
+                <a:latin typeface="Courier New" panose="02070309020205020404" pitchFamily="49" charset="0"/>
+                <a:cs typeface="Courier New" panose="02070309020205020404" pitchFamily="49" charset="0"/>
+              </a:rPr>
+              <a:t> </a:t>
+            </a:r>
+            <a:br>
+              <a:rPr lang="en-US" sz="2800" dirty="0">
+                <a:latin typeface="Courier New" panose="02070309020205020404" pitchFamily="49" charset="0"/>
+                <a:cs typeface="Courier New" panose="02070309020205020404" pitchFamily="49" charset="0"/>
+              </a:rPr>
+            </a:br>
+            <a:r>
+              <a:rPr lang="en-US" sz="2800" dirty="0">
+                <a:latin typeface="Courier New" panose="02070309020205020404" pitchFamily="49" charset="0"/>
+                <a:cs typeface="Courier New" panose="02070309020205020404" pitchFamily="49" charset="0"/>
+              </a:rPr>
+              <a:t>print(“hello world”)</a:t>
+            </a:r>
+          </a:p>
+          <a:p>
+            <a:r>
+              <a:rPr lang="en-US" sz="2800" dirty="0">
+                <a:latin typeface="Courier New" panose="02070309020205020404" pitchFamily="49" charset="0"/>
+                <a:cs typeface="Courier New" panose="02070309020205020404" pitchFamily="49" charset="0"/>
+              </a:rPr>
+              <a:t>$ python </a:t>
+            </a:r>
+            <a:r>
+              <a:rPr lang="en-US" sz="2800" dirty="0" err="1">
+                <a:latin typeface="Courier New" panose="02070309020205020404" pitchFamily="49" charset="0"/>
+                <a:cs typeface="Courier New" panose="02070309020205020404" pitchFamily="49" charset="0"/>
+              </a:rPr>
+              <a:t>test.py</a:t>
+            </a:r>
+            <a:r>
+              <a:rPr lang="en-US" sz="2800" dirty="0">
+                <a:latin typeface="Courier New" panose="02070309020205020404" pitchFamily="49" charset="0"/>
+                <a:cs typeface="Courier New" panose="02070309020205020404" pitchFamily="49" charset="0"/>
+              </a:rPr>
+              <a:t> </a:t>
+            </a:r>
+          </a:p>
+          <a:p>
+            <a:r>
+              <a:rPr lang="en-US" sz="2800" dirty="0">
+                <a:latin typeface="Courier New" panose="02070309020205020404" pitchFamily="49" charset="0"/>
+                <a:cs typeface="Courier New" panose="02070309020205020404" pitchFamily="49" charset="0"/>
+              </a:rPr>
+              <a:t>hello world</a:t>
             </a:r>
           </a:p>
           <a:p>
             <a:endParaRPr lang="en-US" sz="2800" dirty="0">
-              <a:latin typeface="Helvetica Light" panose="020B0403020202020204" pitchFamily="34" charset="0"/>
+              <a:latin typeface="Courier New" panose="02070309020205020404" pitchFamily="49" charset="0"/>
+              <a:cs typeface="Courier New" panose="02070309020205020404" pitchFamily="49" charset="0"/>
             </a:endParaRPr>
-          </a:p>
-          <a:p>
-            <a:r>
-              <a:rPr lang="en-US" sz="2800" dirty="0">
-                <a:latin typeface="Helvetica Light" panose="020B0403020202020204" pitchFamily="34" charset="0"/>
-              </a:rPr>
-              <a:t>Lists: [1 , 2], [“this”, “is”, “a list”]</a:t>
-            </a:r>
-          </a:p>
-          <a:p>
-            <a:endParaRPr lang="en-US" sz="2800" dirty="0">
-              <a:latin typeface="Helvetica Light" panose="020B0403020202020204" pitchFamily="34" charset="0"/>
-            </a:endParaRPr>
-          </a:p>
-          <a:p>
-            <a:r>
-              <a:rPr lang="en-US" sz="2800" dirty="0">
-                <a:latin typeface="Helvetica Light" panose="020B0403020202020204" pitchFamily="34" charset="0"/>
-              </a:rPr>
-              <a:t>Dictionary: {0 : 1, 1 : 2}, {“key” : “value” } </a:t>
-            </a:r>
           </a:p>
         </p:txBody>
       </p:sp>
     </p:spTree>
     <p:extLst>
       <p:ext uri="{BB962C8B-B14F-4D97-AF65-F5344CB8AC3E}">
-        <p14:creationId xmlns:p14="http://schemas.microsoft.com/office/powerpoint/2010/main" val="3905333833"/>
+        <p14:creationId xmlns:p14="http://schemas.microsoft.com/office/powerpoint/2010/main" val="764925536"/>
       </p:ext>
     </p:extLst>
   </p:cSld>
@@ -4553,10 +5039,10 @@
       </p:grpSpPr>
       <p:sp>
         <p:nvSpPr>
-          <p:cNvPr id="5" name="Title 1">
+          <p:cNvPr id="4" name="Title 1">
             <a:extLst>
               <a:ext uri="{FF2B5EF4-FFF2-40B4-BE49-F238E27FC236}">
-                <a16:creationId xmlns:a16="http://schemas.microsoft.com/office/drawing/2014/main" id="{71D0CB43-13FE-8C41-87A9-00A791974839}"/>
+                <a16:creationId xmlns:a16="http://schemas.microsoft.com/office/drawing/2014/main" id="{49CEAF47-07B0-1141-8746-222823DB5A0A}"/>
               </a:ext>
             </a:extLst>
           </p:cNvPr>
@@ -4579,17 +5065,17 @@
           <a:p>
             <a:r>
               <a:rPr lang="en-US" dirty="0"/>
-              <a:t>Numbers</a:t>
-            </a:r>
-          </a:p>
-        </p:txBody>
-      </p:sp>
-      <p:sp>
-        <p:nvSpPr>
-          <p:cNvPr id="6" name="TextBox 5">
+              <a:t>Variable types</a:t>
+            </a:r>
+          </a:p>
+        </p:txBody>
+      </p:sp>
+      <p:sp>
+        <p:nvSpPr>
+          <p:cNvPr id="5" name="TextBox 4">
             <a:extLst>
               <a:ext uri="{FF2B5EF4-FFF2-40B4-BE49-F238E27FC236}">
-                <a16:creationId xmlns:a16="http://schemas.microsoft.com/office/drawing/2014/main" id="{6A852C1C-9E82-B642-8419-E83EFE7DF4FE}"/>
+                <a16:creationId xmlns:a16="http://schemas.microsoft.com/office/drawing/2014/main" id="{4CCB6D70-3ED1-E54A-8756-59E3D01E88D4}"/>
               </a:ext>
             </a:extLst>
           </p:cNvPr>
@@ -4598,8 +5084,8 @@
         </p:nvSpPr>
         <p:spPr>
           <a:xfrm>
-            <a:off x="378372" y="3429000"/>
-            <a:ext cx="8040414" cy="1815882"/>
+            <a:off x="378372" y="1462087"/>
+            <a:ext cx="8040414" cy="3539430"/>
           </a:xfrm>
           <a:prstGeom prst="rect">
             <a:avLst/>
@@ -4614,74 +5100,56 @@
           <a:p>
             <a:r>
               <a:rPr lang="en-US" sz="2800" dirty="0">
-                <a:latin typeface="Courier New" panose="02070309020205020404" pitchFamily="49" charset="0"/>
-                <a:cs typeface="Courier New" panose="02070309020205020404" pitchFamily="49" charset="0"/>
-              </a:rPr>
-              <a:t># Number examples</a:t>
-            </a:r>
-          </a:p>
-          <a:p>
-            <a:r>
-              <a:rPr lang="en-US" sz="2800" dirty="0">
-                <a:latin typeface="Courier New" panose="02070309020205020404" pitchFamily="49" charset="0"/>
-                <a:cs typeface="Courier New" panose="02070309020205020404" pitchFamily="49" charset="0"/>
-              </a:rPr>
-              <a:t>num_1 = 1 # int</a:t>
-            </a:r>
-          </a:p>
-          <a:p>
-            <a:r>
-              <a:rPr lang="en-US" sz="2800" dirty="0">
-                <a:latin typeface="Courier New" panose="02070309020205020404" pitchFamily="49" charset="0"/>
-                <a:cs typeface="Courier New" panose="02070309020205020404" pitchFamily="49" charset="0"/>
-              </a:rPr>
-              <a:t>num_2 = 1.5 # float </a:t>
-            </a:r>
-          </a:p>
-          <a:p>
-            <a:r>
-              <a:rPr lang="en-US" sz="2800" dirty="0">
-                <a:latin typeface="Courier New" panose="02070309020205020404" pitchFamily="49" charset="0"/>
-                <a:cs typeface="Courier New" panose="02070309020205020404" pitchFamily="49" charset="0"/>
-              </a:rPr>
-              <a:t>num_3 = 1. # float </a:t>
-            </a:r>
-          </a:p>
-        </p:txBody>
-      </p:sp>
-      <p:sp>
-        <p:nvSpPr>
-          <p:cNvPr id="7" name="TextBox 6">
-            <a:extLst>
-              <a:ext uri="{FF2B5EF4-FFF2-40B4-BE49-F238E27FC236}">
-                <a16:creationId xmlns:a16="http://schemas.microsoft.com/office/drawing/2014/main" id="{1733FA67-FE21-0044-9ED0-67CA818BB571}"/>
-              </a:ext>
-            </a:extLst>
-          </p:cNvPr>
-          <p:cNvSpPr txBox="1"/>
-          <p:nvPr/>
-        </p:nvSpPr>
-        <p:spPr>
-          <a:xfrm>
-            <a:off x="378372" y="1462087"/>
-            <a:ext cx="8040414" cy="1815882"/>
-          </a:xfrm>
-          <a:prstGeom prst="rect">
-            <a:avLst/>
-          </a:prstGeom>
-          <a:noFill/>
-        </p:spPr>
-        <p:txBody>
-          <a:bodyPr wrap="square" rtlCol="0">
-            <a:spAutoFit/>
-          </a:bodyPr>
-          <a:lstStyle/>
+                <a:latin typeface="Helvetica Light" panose="020B0403020202020204" pitchFamily="34" charset="0"/>
+              </a:rPr>
+              <a:t>Numbers: 2, 3.14, 94504050</a:t>
+            </a:r>
+          </a:p>
+          <a:p>
+            <a:endParaRPr lang="en-US" sz="2800" dirty="0">
+              <a:latin typeface="Helvetica Light" panose="020B0403020202020204" pitchFamily="34" charset="0"/>
+            </a:endParaRPr>
+          </a:p>
           <a:p>
             <a:r>
               <a:rPr lang="en-US" sz="2800" dirty="0">
                 <a:latin typeface="Helvetica Light" panose="020B0403020202020204" pitchFamily="34" charset="0"/>
               </a:rPr>
-              <a:t>There are two types of numbers: int or integers, cannot store fractional values, and float or floating point numbers can store any number in a huge range. </a:t>
+              <a:t>Strings: “hello”, ‘100’, “““ this </a:t>
+            </a:r>
+          </a:p>
+          <a:p>
+            <a:r>
+              <a:rPr lang="en-US" sz="2800" dirty="0">
+                <a:latin typeface="Helvetica Light" panose="020B0403020202020204" pitchFamily="34" charset="0"/>
+              </a:rPr>
+              <a:t>string has multiple lines”””</a:t>
+            </a:r>
+          </a:p>
+          <a:p>
+            <a:endParaRPr lang="en-US" sz="2800" dirty="0">
+              <a:latin typeface="Helvetica Light" panose="020B0403020202020204" pitchFamily="34" charset="0"/>
+            </a:endParaRPr>
+          </a:p>
+          <a:p>
+            <a:r>
+              <a:rPr lang="en-US" sz="2800" dirty="0">
+                <a:latin typeface="Helvetica Light" panose="020B0403020202020204" pitchFamily="34" charset="0"/>
+              </a:rPr>
+              <a:t>Lists: [1 , 2], [“this”, “is”, “a list”]</a:t>
+            </a:r>
+          </a:p>
+          <a:p>
+            <a:endParaRPr lang="en-US" sz="2800" dirty="0">
+              <a:latin typeface="Helvetica Light" panose="020B0403020202020204" pitchFamily="34" charset="0"/>
+            </a:endParaRPr>
+          </a:p>
+          <a:p>
+            <a:r>
+              <a:rPr lang="en-US" sz="2800" dirty="0">
+                <a:latin typeface="Helvetica Light" panose="020B0403020202020204" pitchFamily="34" charset="0"/>
+              </a:rPr>
+              <a:t>Dictionary: {0 : 1, 1 : 2}, {“key” : “value” } </a:t>
             </a:r>
           </a:p>
         </p:txBody>
@@ -4689,7 +5157,7 @@
     </p:spTree>
     <p:extLst>
       <p:ext uri="{BB962C8B-B14F-4D97-AF65-F5344CB8AC3E}">
-        <p14:creationId xmlns:p14="http://schemas.microsoft.com/office/powerpoint/2010/main" val="2885705354"/>
+        <p14:creationId xmlns:p14="http://schemas.microsoft.com/office/powerpoint/2010/main" val="3905333833"/>
       </p:ext>
     </p:extLst>
   </p:cSld>
@@ -4718,10 +5186,10 @@
       </p:grpSpPr>
       <p:sp>
         <p:nvSpPr>
-          <p:cNvPr id="2" name="Title 1">
+          <p:cNvPr id="5" name="Title 1">
             <a:extLst>
               <a:ext uri="{FF2B5EF4-FFF2-40B4-BE49-F238E27FC236}">
-                <a16:creationId xmlns:a16="http://schemas.microsoft.com/office/drawing/2014/main" id="{F889A6B4-ABC8-164D-A645-842681269F09}"/>
+                <a16:creationId xmlns:a16="http://schemas.microsoft.com/office/drawing/2014/main" id="{71D0CB43-13FE-8C41-87A9-00A791974839}"/>
               </a:ext>
             </a:extLst>
           </p:cNvPr>
@@ -4732,24 +5200,29 @@
             <p:ph type="title"/>
           </p:nvPr>
         </p:nvSpPr>
-        <p:spPr/>
+        <p:spPr>
+          <a:xfrm>
+            <a:off x="628650" y="136524"/>
+            <a:ext cx="7886700" cy="1325563"/>
+          </a:xfrm>
+        </p:spPr>
         <p:txBody>
           <a:bodyPr/>
           <a:lstStyle/>
           <a:p>
             <a:r>
               <a:rPr lang="en-US" dirty="0"/>
-              <a:t>Number Operations</a:t>
-            </a:r>
-          </a:p>
-        </p:txBody>
-      </p:sp>
-      <p:sp>
-        <p:nvSpPr>
-          <p:cNvPr id="4" name="TextBox 3">
+              <a:t>Numbers</a:t>
+            </a:r>
+          </a:p>
+        </p:txBody>
+      </p:sp>
+      <p:sp>
+        <p:nvSpPr>
+          <p:cNvPr id="6" name="TextBox 5">
             <a:extLst>
               <a:ext uri="{FF2B5EF4-FFF2-40B4-BE49-F238E27FC236}">
-                <a16:creationId xmlns:a16="http://schemas.microsoft.com/office/drawing/2014/main" id="{3220CE55-0EF8-E54D-ADA1-383749BCADB3}"/>
+                <a16:creationId xmlns:a16="http://schemas.microsoft.com/office/drawing/2014/main" id="{6A852C1C-9E82-B642-8419-E83EFE7DF4FE}"/>
               </a:ext>
             </a:extLst>
           </p:cNvPr>
@@ -4758,8 +5231,8 @@
         </p:nvSpPr>
         <p:spPr>
           <a:xfrm>
-            <a:off x="84082" y="1239173"/>
-            <a:ext cx="4414346" cy="3754874"/>
+            <a:off x="378372" y="3429000"/>
+            <a:ext cx="8040414" cy="1815882"/>
           </a:xfrm>
           <a:prstGeom prst="rect">
             <a:avLst/>
@@ -4773,135 +5246,48 @@
           <a:lstStyle/>
           <a:p>
             <a:r>
-              <a:rPr lang="en-US" sz="1400" dirty="0">
-                <a:latin typeface="Courier New" panose="02070309020205020404" pitchFamily="49" charset="0"/>
-                <a:cs typeface="Courier New" panose="02070309020205020404" pitchFamily="49" charset="0"/>
-              </a:rPr>
-              <a:t>&gt;&gt;&gt; 2 + 3 # int addition</a:t>
-            </a:r>
-          </a:p>
-          <a:p>
-            <a:r>
-              <a:rPr lang="en-US" sz="1400" dirty="0">
-                <a:latin typeface="Courier New" panose="02070309020205020404" pitchFamily="49" charset="0"/>
-                <a:cs typeface="Courier New" panose="02070309020205020404" pitchFamily="49" charset="0"/>
-              </a:rPr>
-              <a:t>5</a:t>
-            </a:r>
-          </a:p>
-          <a:p>
-            <a:endParaRPr lang="en-US" sz="1400" dirty="0">
-              <a:latin typeface="Courier New" panose="02070309020205020404" pitchFamily="49" charset="0"/>
-              <a:cs typeface="Courier New" panose="02070309020205020404" pitchFamily="49" charset="0"/>
-            </a:endParaRPr>
-          </a:p>
-          <a:p>
-            <a:r>
-              <a:rPr lang="en-US" sz="1400" dirty="0">
-                <a:latin typeface="Courier New" panose="02070309020205020404" pitchFamily="49" charset="0"/>
-                <a:cs typeface="Courier New" panose="02070309020205020404" pitchFamily="49" charset="0"/>
-              </a:rPr>
-              <a:t>&gt;&gt;&gt; 2. + 3. # float addition</a:t>
-            </a:r>
-          </a:p>
-          <a:p>
-            <a:r>
-              <a:rPr lang="en-US" sz="1400" dirty="0">
-                <a:latin typeface="Courier New" panose="02070309020205020404" pitchFamily="49" charset="0"/>
-                <a:cs typeface="Courier New" panose="02070309020205020404" pitchFamily="49" charset="0"/>
-              </a:rPr>
-              <a:t>5.0</a:t>
-            </a:r>
-          </a:p>
-          <a:p>
-            <a:endParaRPr lang="en-US" sz="1400" dirty="0">
-              <a:latin typeface="Courier New" panose="02070309020205020404" pitchFamily="49" charset="0"/>
-              <a:cs typeface="Courier New" panose="02070309020205020404" pitchFamily="49" charset="0"/>
-            </a:endParaRPr>
-          </a:p>
-          <a:p>
-            <a:r>
-              <a:rPr lang="en-US" sz="1400" dirty="0">
-                <a:latin typeface="Courier New" panose="02070309020205020404" pitchFamily="49" charset="0"/>
-                <a:cs typeface="Courier New" panose="02070309020205020404" pitchFamily="49" charset="0"/>
-              </a:rPr>
-              <a:t>&gt;&gt;&gt; 2. + 3 # still float addition since </a:t>
-            </a:r>
-          </a:p>
-          <a:p>
-            <a:r>
-              <a:rPr lang="en-US" sz="1400" dirty="0">
-                <a:latin typeface="Courier New" panose="02070309020205020404" pitchFamily="49" charset="0"/>
-                <a:cs typeface="Courier New" panose="02070309020205020404" pitchFamily="49" charset="0"/>
-              </a:rPr>
-              <a:t>one of the two number is a float</a:t>
-            </a:r>
-          </a:p>
-          <a:p>
-            <a:r>
-              <a:rPr lang="en-US" sz="1400" dirty="0">
-                <a:latin typeface="Courier New" panose="02070309020205020404" pitchFamily="49" charset="0"/>
-                <a:cs typeface="Courier New" panose="02070309020205020404" pitchFamily="49" charset="0"/>
-              </a:rPr>
-              <a:t>5.0</a:t>
-            </a:r>
-          </a:p>
-          <a:p>
-            <a:endParaRPr lang="en-US" sz="1400" dirty="0">
-              <a:latin typeface="Courier New" panose="02070309020205020404" pitchFamily="49" charset="0"/>
-              <a:cs typeface="Courier New" panose="02070309020205020404" pitchFamily="49" charset="0"/>
-            </a:endParaRPr>
-          </a:p>
-          <a:p>
-            <a:r>
-              <a:rPr lang="en-US" sz="1400" dirty="0">
-                <a:latin typeface="Courier New" panose="02070309020205020404" pitchFamily="49" charset="0"/>
-                <a:cs typeface="Courier New" panose="02070309020205020404" pitchFamily="49" charset="0"/>
-              </a:rPr>
-              <a:t>&gt;&gt;&gt; 5 / 2 # int division, there can be no fractional values in int, thus is rounded down </a:t>
-            </a:r>
-          </a:p>
-          <a:p>
-            <a:r>
-              <a:rPr lang="en-US" sz="1400" dirty="0">
-                <a:latin typeface="Courier New" panose="02070309020205020404" pitchFamily="49" charset="0"/>
-                <a:cs typeface="Courier New" panose="02070309020205020404" pitchFamily="49" charset="0"/>
-              </a:rPr>
-              <a:t>2 </a:t>
-            </a:r>
-          </a:p>
-          <a:p>
-            <a:endParaRPr lang="en-US" sz="1400" dirty="0">
-              <a:latin typeface="Courier New" panose="02070309020205020404" pitchFamily="49" charset="0"/>
-              <a:cs typeface="Courier New" panose="02070309020205020404" pitchFamily="49" charset="0"/>
-            </a:endParaRPr>
-          </a:p>
-          <a:p>
-            <a:r>
-              <a:rPr lang="en-US" sz="1400" dirty="0">
-                <a:latin typeface="Courier New" panose="02070309020205020404" pitchFamily="49" charset="0"/>
-                <a:cs typeface="Courier New" panose="02070309020205020404" pitchFamily="49" charset="0"/>
-              </a:rPr>
-              <a:t>&gt;&gt;&gt; 5. / 2. # float division </a:t>
-            </a:r>
-          </a:p>
-          <a:p>
-            <a:r>
-              <a:rPr lang="en-US" sz="1400" dirty="0">
-                <a:latin typeface="Courier New" panose="02070309020205020404" pitchFamily="49" charset="0"/>
-                <a:cs typeface="Courier New" panose="02070309020205020404" pitchFamily="49" charset="0"/>
-              </a:rPr>
-              <a:t>2.5 </a:t>
-            </a:r>
-          </a:p>
-        </p:txBody>
-      </p:sp>
-      <p:sp>
-        <p:nvSpPr>
-          <p:cNvPr id="5" name="TextBox 4">
+              <a:rPr lang="en-US" sz="2800" dirty="0">
+                <a:latin typeface="Courier New" panose="02070309020205020404" pitchFamily="49" charset="0"/>
+                <a:cs typeface="Courier New" panose="02070309020205020404" pitchFamily="49" charset="0"/>
+              </a:rPr>
+              <a:t># Number examples</a:t>
+            </a:r>
+          </a:p>
+          <a:p>
+            <a:r>
+              <a:rPr lang="en-US" sz="2800" dirty="0">
+                <a:latin typeface="Courier New" panose="02070309020205020404" pitchFamily="49" charset="0"/>
+                <a:cs typeface="Courier New" panose="02070309020205020404" pitchFamily="49" charset="0"/>
+              </a:rPr>
+              <a:t>num_1 = 1 # int</a:t>
+            </a:r>
+          </a:p>
+          <a:p>
+            <a:r>
+              <a:rPr lang="en-US" sz="2800" dirty="0">
+                <a:latin typeface="Courier New" panose="02070309020205020404" pitchFamily="49" charset="0"/>
+                <a:cs typeface="Courier New" panose="02070309020205020404" pitchFamily="49" charset="0"/>
+              </a:rPr>
+              <a:t>num_2 = 1.5 # float </a:t>
+            </a:r>
+          </a:p>
+          <a:p>
+            <a:r>
+              <a:rPr lang="en-US" sz="2800" dirty="0">
+                <a:latin typeface="Courier New" panose="02070309020205020404" pitchFamily="49" charset="0"/>
+                <a:cs typeface="Courier New" panose="02070309020205020404" pitchFamily="49" charset="0"/>
+              </a:rPr>
+              <a:t>num_3 = 1. # float </a:t>
+            </a:r>
+          </a:p>
+        </p:txBody>
+      </p:sp>
+      <p:sp>
+        <p:nvSpPr>
+          <p:cNvPr id="7" name="TextBox 6">
             <a:extLst>
               <a:ext uri="{FF2B5EF4-FFF2-40B4-BE49-F238E27FC236}">
-                <a16:creationId xmlns:a16="http://schemas.microsoft.com/office/drawing/2014/main" id="{DE0F4AE6-A1A5-FD47-B4A2-0D0203772C9C}"/>
+                <a16:creationId xmlns:a16="http://schemas.microsoft.com/office/drawing/2014/main" id="{1733FA67-FE21-0044-9ED0-67CA818BB571}"/>
               </a:ext>
             </a:extLst>
           </p:cNvPr>
@@ -4910,8 +5296,8 @@
         </p:nvSpPr>
         <p:spPr>
           <a:xfrm>
-            <a:off x="84082" y="5242034"/>
-            <a:ext cx="8686801" cy="923330"/>
+            <a:off x="378372" y="1462087"/>
+            <a:ext cx="8040414" cy="1815882"/>
           </a:xfrm>
           <a:prstGeom prst="rect">
             <a:avLst/>
@@ -4925,171 +5311,10 @@
           <a:lstStyle/>
           <a:p>
             <a:r>
-              <a:rPr lang="en-US" dirty="0">
-                <a:latin typeface="Courier New" panose="02070309020205020404" pitchFamily="49" charset="0"/>
-                <a:cs typeface="Courier New" panose="02070309020205020404" pitchFamily="49" charset="0"/>
-              </a:rPr>
-              <a:t>All operations: +, -, *, /, //, %, &gt;, &lt;, ==, !=, &gt;=, &lt;=, *=, +=, -=, /= </a:t>
-            </a:r>
-          </a:p>
-          <a:p>
-            <a:r>
-              <a:rPr lang="en-US" dirty="0">
-                <a:latin typeface="Courier New" panose="02070309020205020404" pitchFamily="49" charset="0"/>
-                <a:cs typeface="Courier New" panose="02070309020205020404" pitchFamily="49" charset="0"/>
-              </a:rPr>
-              <a:t>Take 5 mins to try some operations, are there any surprises?</a:t>
-            </a:r>
-          </a:p>
-        </p:txBody>
-      </p:sp>
-      <p:sp>
-        <p:nvSpPr>
-          <p:cNvPr id="6" name="TextBox 5">
-            <a:extLst>
-              <a:ext uri="{FF2B5EF4-FFF2-40B4-BE49-F238E27FC236}">
-                <a16:creationId xmlns:a16="http://schemas.microsoft.com/office/drawing/2014/main" id="{2BC70847-7038-7B40-88E9-508A0A4BD85D}"/>
-              </a:ext>
-            </a:extLst>
-          </p:cNvPr>
-          <p:cNvSpPr txBox="1"/>
-          <p:nvPr/>
-        </p:nvSpPr>
-        <p:spPr>
-          <a:xfrm>
-            <a:off x="4729654" y="1259148"/>
-            <a:ext cx="4414346" cy="3323987"/>
-          </a:xfrm>
-          <a:prstGeom prst="rect">
-            <a:avLst/>
-          </a:prstGeom>
-          <a:noFill/>
-        </p:spPr>
-        <p:txBody>
-          <a:bodyPr wrap="square" rtlCol="0">
-            <a:spAutoFit/>
-          </a:bodyPr>
-          <a:lstStyle/>
-          <a:p>
-            <a:r>
-              <a:rPr lang="en-US" sz="1400" dirty="0">
-                <a:latin typeface="Courier New" panose="02070309020205020404" pitchFamily="49" charset="0"/>
-                <a:cs typeface="Courier New" panose="02070309020205020404" pitchFamily="49" charset="0"/>
-              </a:rPr>
-              <a:t>&gt;&gt;&gt;1 == 1 # with </a:t>
-            </a:r>
-            <a:r>
-              <a:rPr lang="en-US" sz="1400" dirty="0" err="1">
-                <a:latin typeface="Courier New" panose="02070309020205020404" pitchFamily="49" charset="0"/>
-                <a:cs typeface="Courier New" panose="02070309020205020404" pitchFamily="49" charset="0"/>
-              </a:rPr>
-              <a:t>ints</a:t>
-            </a:r>
-            <a:r>
-              <a:rPr lang="en-US" sz="1400" dirty="0">
-                <a:latin typeface="Courier New" panose="02070309020205020404" pitchFamily="49" charset="0"/>
-                <a:cs typeface="Courier New" panose="02070309020205020404" pitchFamily="49" charset="0"/>
-              </a:rPr>
-              <a:t> it is always possible to check to see if they are same value with "==" operator </a:t>
-            </a:r>
-          </a:p>
-          <a:p>
-            <a:r>
-              <a:rPr lang="en-US" sz="1400" dirty="0">
-                <a:latin typeface="Courier New" panose="02070309020205020404" pitchFamily="49" charset="0"/>
-                <a:cs typeface="Courier New" panose="02070309020205020404" pitchFamily="49" charset="0"/>
-              </a:rPr>
-              <a:t>True</a:t>
-            </a:r>
-          </a:p>
-          <a:p>
-            <a:endParaRPr lang="en-US" sz="1400" dirty="0">
-              <a:latin typeface="Courier New" panose="02070309020205020404" pitchFamily="49" charset="0"/>
-              <a:cs typeface="Courier New" panose="02070309020205020404" pitchFamily="49" charset="0"/>
-            </a:endParaRPr>
-          </a:p>
-          <a:p>
-            <a:r>
-              <a:rPr lang="en-US" sz="1400" dirty="0">
-                <a:latin typeface="Courier New" panose="02070309020205020404" pitchFamily="49" charset="0"/>
-                <a:cs typeface="Courier New" panose="02070309020205020404" pitchFamily="49" charset="0"/>
-              </a:rPr>
-              <a:t>&gt;&gt;&gt;1 &gt; 2</a:t>
-            </a:r>
-          </a:p>
-          <a:p>
-            <a:r>
-              <a:rPr lang="en-US" sz="1400" dirty="0">
-                <a:latin typeface="Courier New" panose="02070309020205020404" pitchFamily="49" charset="0"/>
-                <a:cs typeface="Courier New" panose="02070309020205020404" pitchFamily="49" charset="0"/>
-              </a:rPr>
-              <a:t>False</a:t>
-            </a:r>
-          </a:p>
-          <a:p>
-            <a:endParaRPr lang="en-US" sz="1400" dirty="0">
-              <a:latin typeface="Courier New" panose="02070309020205020404" pitchFamily="49" charset="0"/>
-              <a:cs typeface="Courier New" panose="02070309020205020404" pitchFamily="49" charset="0"/>
-            </a:endParaRPr>
-          </a:p>
-          <a:p>
-            <a:r>
-              <a:rPr lang="en-US" sz="1400" dirty="0">
-                <a:latin typeface="Courier New" panose="02070309020205020404" pitchFamily="49" charset="0"/>
-                <a:cs typeface="Courier New" panose="02070309020205020404" pitchFamily="49" charset="0"/>
-              </a:rPr>
-              <a:t>&gt;&gt;&gt;2 &gt;= 2 # greater or equal </a:t>
-            </a:r>
-          </a:p>
-          <a:p>
-            <a:r>
-              <a:rPr lang="en-US" sz="1400" dirty="0">
-                <a:latin typeface="Courier New" panose="02070309020205020404" pitchFamily="49" charset="0"/>
-                <a:cs typeface="Courier New" panose="02070309020205020404" pitchFamily="49" charset="0"/>
-              </a:rPr>
-              <a:t>True</a:t>
-            </a:r>
-          </a:p>
-          <a:p>
-            <a:endParaRPr lang="en-US" sz="1400" dirty="0">
-              <a:latin typeface="Courier New" panose="02070309020205020404" pitchFamily="49" charset="0"/>
-              <a:cs typeface="Courier New" panose="02070309020205020404" pitchFamily="49" charset="0"/>
-            </a:endParaRPr>
-          </a:p>
-          <a:p>
-            <a:r>
-              <a:rPr lang="en-US" sz="1400" dirty="0">
-                <a:latin typeface="Courier New" panose="02070309020205020404" pitchFamily="49" charset="0"/>
-                <a:cs typeface="Courier New" panose="02070309020205020404" pitchFamily="49" charset="0"/>
-              </a:rPr>
-              <a:t>&gt;&gt;&gt;a = 5 </a:t>
-            </a:r>
-          </a:p>
-          <a:p>
-            <a:r>
-              <a:rPr lang="en-US" sz="1400" dirty="0">
-                <a:latin typeface="Courier New" panose="02070309020205020404" pitchFamily="49" charset="0"/>
-                <a:cs typeface="Courier New" panose="02070309020205020404" pitchFamily="49" charset="0"/>
-              </a:rPr>
-              <a:t>&gt;&gt;&gt;a += 5 # same as a = a + 5</a:t>
-            </a:r>
-          </a:p>
-          <a:p>
-            <a:r>
-              <a:rPr lang="en-US" sz="1400" dirty="0">
-                <a:latin typeface="Courier New" panose="02070309020205020404" pitchFamily="49" charset="0"/>
-                <a:cs typeface="Courier New" panose="02070309020205020404" pitchFamily="49" charset="0"/>
-              </a:rPr>
-              <a:t>&gt;&gt;&gt;print(a)</a:t>
-            </a:r>
-          </a:p>
-          <a:p>
-            <a:r>
-              <a:rPr lang="en-US" sz="1400" dirty="0">
-                <a:latin typeface="Courier New" panose="02070309020205020404" pitchFamily="49" charset="0"/>
-                <a:cs typeface="Courier New" panose="02070309020205020404" pitchFamily="49" charset="0"/>
-              </a:rPr>
-              <a:t>10</a:t>
+              <a:rPr lang="en-US" sz="2800" dirty="0">
+                <a:latin typeface="Helvetica Light" panose="020B0403020202020204" pitchFamily="34" charset="0"/>
+              </a:rPr>
+              <a:t>There are two types of numbers: int or integers, cannot store fractional values, and float or floating point numbers can store any number in a huge range. </a:t>
             </a:r>
           </a:p>
         </p:txBody>
@@ -5097,7 +5322,7 @@
     </p:spTree>
     <p:extLst>
       <p:ext uri="{BB962C8B-B14F-4D97-AF65-F5344CB8AC3E}">
-        <p14:creationId xmlns:p14="http://schemas.microsoft.com/office/powerpoint/2010/main" val="4164762645"/>
+        <p14:creationId xmlns:p14="http://schemas.microsoft.com/office/powerpoint/2010/main" val="2885705354"/>
       </p:ext>
     </p:extLst>
   </p:cSld>
@@ -5147,17 +5372,17 @@
           <a:p>
             <a:r>
               <a:rPr lang="en-US" dirty="0"/>
-              <a:t>Strings</a:t>
-            </a:r>
-          </a:p>
-        </p:txBody>
-      </p:sp>
-      <p:sp>
-        <p:nvSpPr>
-          <p:cNvPr id="3" name="TextBox 2">
+              <a:t>Number Operations</a:t>
+            </a:r>
+          </a:p>
+        </p:txBody>
+      </p:sp>
+      <p:sp>
+        <p:nvSpPr>
+          <p:cNvPr id="4" name="TextBox 3">
             <a:extLst>
               <a:ext uri="{FF2B5EF4-FFF2-40B4-BE49-F238E27FC236}">
-                <a16:creationId xmlns:a16="http://schemas.microsoft.com/office/drawing/2014/main" id="{6D3B0E03-0AE4-244E-971F-8A8306CFA7E3}"/>
+                <a16:creationId xmlns:a16="http://schemas.microsoft.com/office/drawing/2014/main" id="{3220CE55-0EF8-E54D-ADA1-383749BCADB3}"/>
               </a:ext>
             </a:extLst>
           </p:cNvPr>
@@ -5166,8 +5391,8 @@
         </p:nvSpPr>
         <p:spPr>
           <a:xfrm>
-            <a:off x="378372" y="2167758"/>
-            <a:ext cx="8040414" cy="3539430"/>
+            <a:off x="84082" y="1239173"/>
+            <a:ext cx="4414346" cy="3754874"/>
           </a:xfrm>
           <a:prstGeom prst="rect">
             <a:avLst/>
@@ -5181,80 +5406,135 @@
           <a:lstStyle/>
           <a:p>
             <a:r>
-              <a:rPr lang="en-US" sz="2800" dirty="0">
-                <a:latin typeface="Courier New" panose="02070309020205020404" pitchFamily="49" charset="0"/>
-                <a:cs typeface="Courier New" panose="02070309020205020404" pitchFamily="49" charset="0"/>
-              </a:rPr>
-              <a:t># can use 'single quotes' or "double quotes" or """triple quotes"""</a:t>
-            </a:r>
-          </a:p>
-          <a:p>
-            <a:r>
-              <a:rPr lang="en-US" sz="2800" dirty="0">
-                <a:latin typeface="Courier New" panose="02070309020205020404" pitchFamily="49" charset="0"/>
-                <a:cs typeface="Courier New" panose="02070309020205020404" pitchFamily="49" charset="0"/>
-              </a:rPr>
-              <a:t># triple quotes and span multiple lines</a:t>
-            </a:r>
-          </a:p>
-          <a:p>
-            <a:r>
-              <a:rPr lang="en-US" sz="2800" dirty="0">
-                <a:latin typeface="Courier New" panose="02070309020205020404" pitchFamily="49" charset="0"/>
-                <a:cs typeface="Courier New" panose="02070309020205020404" pitchFamily="49" charset="0"/>
-              </a:rPr>
-              <a:t>str_1 = "Hello World"</a:t>
-            </a:r>
-          </a:p>
-          <a:p>
-            <a:r>
-              <a:rPr lang="en-US" sz="2800" dirty="0">
-                <a:latin typeface="Courier New" panose="02070309020205020404" pitchFamily="49" charset="0"/>
-                <a:cs typeface="Courier New" panose="02070309020205020404" pitchFamily="49" charset="0"/>
-              </a:rPr>
-              <a:t>str_2 = '100'</a:t>
-            </a:r>
-          </a:p>
-          <a:p>
-            <a:r>
-              <a:rPr lang="en-US" sz="2800" dirty="0">
-                <a:latin typeface="Courier New" panose="02070309020205020404" pitchFamily="49" charset="0"/>
-                <a:cs typeface="Courier New" panose="02070309020205020404" pitchFamily="49" charset="0"/>
-              </a:rPr>
-              <a:t>str_3 = """</a:t>
-            </a:r>
-            <a:r>
-              <a:rPr lang="en-US" sz="2800" dirty="0" err="1">
-                <a:latin typeface="Courier New" panose="02070309020205020404" pitchFamily="49" charset="0"/>
-                <a:cs typeface="Courier New" panose="02070309020205020404" pitchFamily="49" charset="0"/>
-              </a:rPr>
-              <a:t>sdgwerg</a:t>
-            </a:r>
-            <a:r>
-              <a:rPr lang="en-US" sz="2800" dirty="0">
-                <a:latin typeface="Courier New" panose="02070309020205020404" pitchFamily="49" charset="0"/>
-                <a:cs typeface="Courier New" panose="02070309020205020404" pitchFamily="49" charset="0"/>
-              </a:rPr>
-              <a:t>@#$@</a:t>
-            </a:r>
-          </a:p>
-          <a:p>
-            <a:r>
-              <a:rPr lang="en-US" sz="2800" dirty="0">
-                <a:latin typeface="Courier New" panose="02070309020205020404" pitchFamily="49" charset="0"/>
-                <a:cs typeface="Courier New" panose="02070309020205020404" pitchFamily="49" charset="0"/>
-              </a:rPr>
-              <a:t>			 #$%343 """</a:t>
-            </a:r>
-          </a:p>
-        </p:txBody>
-      </p:sp>
-      <p:sp>
-        <p:nvSpPr>
-          <p:cNvPr id="4" name="TextBox 3">
+              <a:rPr lang="en-US" sz="1400" dirty="0">
+                <a:latin typeface="Courier New" panose="02070309020205020404" pitchFamily="49" charset="0"/>
+                <a:cs typeface="Courier New" panose="02070309020205020404" pitchFamily="49" charset="0"/>
+              </a:rPr>
+              <a:t>&gt;&gt;&gt; 2 + 3 # int addition</a:t>
+            </a:r>
+          </a:p>
+          <a:p>
+            <a:r>
+              <a:rPr lang="en-US" sz="1400" dirty="0">
+                <a:latin typeface="Courier New" panose="02070309020205020404" pitchFamily="49" charset="0"/>
+                <a:cs typeface="Courier New" panose="02070309020205020404" pitchFamily="49" charset="0"/>
+              </a:rPr>
+              <a:t>5</a:t>
+            </a:r>
+          </a:p>
+          <a:p>
+            <a:endParaRPr lang="en-US" sz="1400" dirty="0">
+              <a:latin typeface="Courier New" panose="02070309020205020404" pitchFamily="49" charset="0"/>
+              <a:cs typeface="Courier New" panose="02070309020205020404" pitchFamily="49" charset="0"/>
+            </a:endParaRPr>
+          </a:p>
+          <a:p>
+            <a:r>
+              <a:rPr lang="en-US" sz="1400" dirty="0">
+                <a:latin typeface="Courier New" panose="02070309020205020404" pitchFamily="49" charset="0"/>
+                <a:cs typeface="Courier New" panose="02070309020205020404" pitchFamily="49" charset="0"/>
+              </a:rPr>
+              <a:t>&gt;&gt;&gt; 2. + 3. # float addition</a:t>
+            </a:r>
+          </a:p>
+          <a:p>
+            <a:r>
+              <a:rPr lang="en-US" sz="1400" dirty="0">
+                <a:latin typeface="Courier New" panose="02070309020205020404" pitchFamily="49" charset="0"/>
+                <a:cs typeface="Courier New" panose="02070309020205020404" pitchFamily="49" charset="0"/>
+              </a:rPr>
+              <a:t>5.0</a:t>
+            </a:r>
+          </a:p>
+          <a:p>
+            <a:endParaRPr lang="en-US" sz="1400" dirty="0">
+              <a:latin typeface="Courier New" panose="02070309020205020404" pitchFamily="49" charset="0"/>
+              <a:cs typeface="Courier New" panose="02070309020205020404" pitchFamily="49" charset="0"/>
+            </a:endParaRPr>
+          </a:p>
+          <a:p>
+            <a:r>
+              <a:rPr lang="en-US" sz="1400" dirty="0">
+                <a:latin typeface="Courier New" panose="02070309020205020404" pitchFamily="49" charset="0"/>
+                <a:cs typeface="Courier New" panose="02070309020205020404" pitchFamily="49" charset="0"/>
+              </a:rPr>
+              <a:t>&gt;&gt;&gt; 2. + 3 # still float addition since </a:t>
+            </a:r>
+          </a:p>
+          <a:p>
+            <a:r>
+              <a:rPr lang="en-US" sz="1400" dirty="0">
+                <a:latin typeface="Courier New" panose="02070309020205020404" pitchFamily="49" charset="0"/>
+                <a:cs typeface="Courier New" panose="02070309020205020404" pitchFamily="49" charset="0"/>
+              </a:rPr>
+              <a:t>one of the two number is a float</a:t>
+            </a:r>
+          </a:p>
+          <a:p>
+            <a:r>
+              <a:rPr lang="en-US" sz="1400" dirty="0">
+                <a:latin typeface="Courier New" panose="02070309020205020404" pitchFamily="49" charset="0"/>
+                <a:cs typeface="Courier New" panose="02070309020205020404" pitchFamily="49" charset="0"/>
+              </a:rPr>
+              <a:t>5.0</a:t>
+            </a:r>
+          </a:p>
+          <a:p>
+            <a:endParaRPr lang="en-US" sz="1400" dirty="0">
+              <a:latin typeface="Courier New" panose="02070309020205020404" pitchFamily="49" charset="0"/>
+              <a:cs typeface="Courier New" panose="02070309020205020404" pitchFamily="49" charset="0"/>
+            </a:endParaRPr>
+          </a:p>
+          <a:p>
+            <a:r>
+              <a:rPr lang="en-US" sz="1400" dirty="0">
+                <a:latin typeface="Courier New" panose="02070309020205020404" pitchFamily="49" charset="0"/>
+                <a:cs typeface="Courier New" panose="02070309020205020404" pitchFamily="49" charset="0"/>
+              </a:rPr>
+              <a:t>&gt;&gt;&gt; 5 / 2 # int division, there can be no fractional values in int, thus is rounded down </a:t>
+            </a:r>
+          </a:p>
+          <a:p>
+            <a:r>
+              <a:rPr lang="en-US" sz="1400" dirty="0">
+                <a:latin typeface="Courier New" panose="02070309020205020404" pitchFamily="49" charset="0"/>
+                <a:cs typeface="Courier New" panose="02070309020205020404" pitchFamily="49" charset="0"/>
+              </a:rPr>
+              <a:t>2 </a:t>
+            </a:r>
+          </a:p>
+          <a:p>
+            <a:endParaRPr lang="en-US" sz="1400" dirty="0">
+              <a:latin typeface="Courier New" panose="02070309020205020404" pitchFamily="49" charset="0"/>
+              <a:cs typeface="Courier New" panose="02070309020205020404" pitchFamily="49" charset="0"/>
+            </a:endParaRPr>
+          </a:p>
+          <a:p>
+            <a:r>
+              <a:rPr lang="en-US" sz="1400" dirty="0">
+                <a:latin typeface="Courier New" panose="02070309020205020404" pitchFamily="49" charset="0"/>
+                <a:cs typeface="Courier New" panose="02070309020205020404" pitchFamily="49" charset="0"/>
+              </a:rPr>
+              <a:t>&gt;&gt;&gt; 5. / 2. # float division </a:t>
+            </a:r>
+          </a:p>
+          <a:p>
+            <a:r>
+              <a:rPr lang="en-US" sz="1400" dirty="0">
+                <a:latin typeface="Courier New" panose="02070309020205020404" pitchFamily="49" charset="0"/>
+                <a:cs typeface="Courier New" panose="02070309020205020404" pitchFamily="49" charset="0"/>
+              </a:rPr>
+              <a:t>2.5 </a:t>
+            </a:r>
+          </a:p>
+        </p:txBody>
+      </p:sp>
+      <p:sp>
+        <p:nvSpPr>
+          <p:cNvPr id="5" name="TextBox 4">
             <a:extLst>
               <a:ext uri="{FF2B5EF4-FFF2-40B4-BE49-F238E27FC236}">
-                <a16:creationId xmlns:a16="http://schemas.microsoft.com/office/drawing/2014/main" id="{46248A77-B36C-D941-99FE-A27742D1BAD3}"/>
+                <a16:creationId xmlns:a16="http://schemas.microsoft.com/office/drawing/2014/main" id="{DE0F4AE6-A1A5-FD47-B4A2-0D0203772C9C}"/>
               </a:ext>
             </a:extLst>
           </p:cNvPr>
@@ -5263,8 +5543,8 @@
         </p:nvSpPr>
         <p:spPr>
           <a:xfrm>
-            <a:off x="378372" y="1462087"/>
-            <a:ext cx="8040414" cy="523220"/>
+            <a:off x="84082" y="5242034"/>
+            <a:ext cx="8686801" cy="923330"/>
           </a:xfrm>
           <a:prstGeom prst="rect">
             <a:avLst/>
@@ -5278,10 +5558,171 @@
           <a:lstStyle/>
           <a:p>
             <a:r>
-              <a:rPr lang="en-US" sz="2800" dirty="0">
-                <a:latin typeface="Helvetica Light" panose="020B0403020202020204" pitchFamily="34" charset="0"/>
-              </a:rPr>
-              <a:t>Strings store text or any series of characters</a:t>
+              <a:rPr lang="en-US" dirty="0">
+                <a:latin typeface="Courier New" panose="02070309020205020404" pitchFamily="49" charset="0"/>
+                <a:cs typeface="Courier New" panose="02070309020205020404" pitchFamily="49" charset="0"/>
+              </a:rPr>
+              <a:t>All operations: +, -, *, /, //, %, &gt;, &lt;, ==, !=, &gt;=, &lt;=, *=, +=, -=, /= </a:t>
+            </a:r>
+          </a:p>
+          <a:p>
+            <a:r>
+              <a:rPr lang="en-US" dirty="0">
+                <a:latin typeface="Courier New" panose="02070309020205020404" pitchFamily="49" charset="0"/>
+                <a:cs typeface="Courier New" panose="02070309020205020404" pitchFamily="49" charset="0"/>
+              </a:rPr>
+              <a:t>Take 5 mins to try some operations, are there any surprises?</a:t>
+            </a:r>
+          </a:p>
+        </p:txBody>
+      </p:sp>
+      <p:sp>
+        <p:nvSpPr>
+          <p:cNvPr id="6" name="TextBox 5">
+            <a:extLst>
+              <a:ext uri="{FF2B5EF4-FFF2-40B4-BE49-F238E27FC236}">
+                <a16:creationId xmlns:a16="http://schemas.microsoft.com/office/drawing/2014/main" id="{2BC70847-7038-7B40-88E9-508A0A4BD85D}"/>
+              </a:ext>
+            </a:extLst>
+          </p:cNvPr>
+          <p:cNvSpPr txBox="1"/>
+          <p:nvPr/>
+        </p:nvSpPr>
+        <p:spPr>
+          <a:xfrm>
+            <a:off x="4729654" y="1259148"/>
+            <a:ext cx="4414346" cy="3323987"/>
+          </a:xfrm>
+          <a:prstGeom prst="rect">
+            <a:avLst/>
+          </a:prstGeom>
+          <a:noFill/>
+        </p:spPr>
+        <p:txBody>
+          <a:bodyPr wrap="square" rtlCol="0">
+            <a:spAutoFit/>
+          </a:bodyPr>
+          <a:lstStyle/>
+          <a:p>
+            <a:r>
+              <a:rPr lang="en-US" sz="1400" dirty="0">
+                <a:latin typeface="Courier New" panose="02070309020205020404" pitchFamily="49" charset="0"/>
+                <a:cs typeface="Courier New" panose="02070309020205020404" pitchFamily="49" charset="0"/>
+              </a:rPr>
+              <a:t>&gt;&gt;&gt;1 == 1 # with </a:t>
+            </a:r>
+            <a:r>
+              <a:rPr lang="en-US" sz="1400" dirty="0" err="1">
+                <a:latin typeface="Courier New" panose="02070309020205020404" pitchFamily="49" charset="0"/>
+                <a:cs typeface="Courier New" panose="02070309020205020404" pitchFamily="49" charset="0"/>
+              </a:rPr>
+              <a:t>ints</a:t>
+            </a:r>
+            <a:r>
+              <a:rPr lang="en-US" sz="1400" dirty="0">
+                <a:latin typeface="Courier New" panose="02070309020205020404" pitchFamily="49" charset="0"/>
+                <a:cs typeface="Courier New" panose="02070309020205020404" pitchFamily="49" charset="0"/>
+              </a:rPr>
+              <a:t> it is always possible to check to see if they are same value with "==" operator </a:t>
+            </a:r>
+          </a:p>
+          <a:p>
+            <a:r>
+              <a:rPr lang="en-US" sz="1400" dirty="0">
+                <a:latin typeface="Courier New" panose="02070309020205020404" pitchFamily="49" charset="0"/>
+                <a:cs typeface="Courier New" panose="02070309020205020404" pitchFamily="49" charset="0"/>
+              </a:rPr>
+              <a:t>True</a:t>
+            </a:r>
+          </a:p>
+          <a:p>
+            <a:endParaRPr lang="en-US" sz="1400" dirty="0">
+              <a:latin typeface="Courier New" panose="02070309020205020404" pitchFamily="49" charset="0"/>
+              <a:cs typeface="Courier New" panose="02070309020205020404" pitchFamily="49" charset="0"/>
+            </a:endParaRPr>
+          </a:p>
+          <a:p>
+            <a:r>
+              <a:rPr lang="en-US" sz="1400" dirty="0">
+                <a:latin typeface="Courier New" panose="02070309020205020404" pitchFamily="49" charset="0"/>
+                <a:cs typeface="Courier New" panose="02070309020205020404" pitchFamily="49" charset="0"/>
+              </a:rPr>
+              <a:t>&gt;&gt;&gt;1 &gt; 2</a:t>
+            </a:r>
+          </a:p>
+          <a:p>
+            <a:r>
+              <a:rPr lang="en-US" sz="1400" dirty="0">
+                <a:latin typeface="Courier New" panose="02070309020205020404" pitchFamily="49" charset="0"/>
+                <a:cs typeface="Courier New" panose="02070309020205020404" pitchFamily="49" charset="0"/>
+              </a:rPr>
+              <a:t>False</a:t>
+            </a:r>
+          </a:p>
+          <a:p>
+            <a:endParaRPr lang="en-US" sz="1400" dirty="0">
+              <a:latin typeface="Courier New" panose="02070309020205020404" pitchFamily="49" charset="0"/>
+              <a:cs typeface="Courier New" panose="02070309020205020404" pitchFamily="49" charset="0"/>
+            </a:endParaRPr>
+          </a:p>
+          <a:p>
+            <a:r>
+              <a:rPr lang="en-US" sz="1400" dirty="0">
+                <a:latin typeface="Courier New" panose="02070309020205020404" pitchFamily="49" charset="0"/>
+                <a:cs typeface="Courier New" panose="02070309020205020404" pitchFamily="49" charset="0"/>
+              </a:rPr>
+              <a:t>&gt;&gt;&gt;2 &gt;= 2 # greater or equal </a:t>
+            </a:r>
+          </a:p>
+          <a:p>
+            <a:r>
+              <a:rPr lang="en-US" sz="1400" dirty="0">
+                <a:latin typeface="Courier New" panose="02070309020205020404" pitchFamily="49" charset="0"/>
+                <a:cs typeface="Courier New" panose="02070309020205020404" pitchFamily="49" charset="0"/>
+              </a:rPr>
+              <a:t>True</a:t>
+            </a:r>
+          </a:p>
+          <a:p>
+            <a:endParaRPr lang="en-US" sz="1400" dirty="0">
+              <a:latin typeface="Courier New" panose="02070309020205020404" pitchFamily="49" charset="0"/>
+              <a:cs typeface="Courier New" panose="02070309020205020404" pitchFamily="49" charset="0"/>
+            </a:endParaRPr>
+          </a:p>
+          <a:p>
+            <a:r>
+              <a:rPr lang="en-US" sz="1400" dirty="0">
+                <a:latin typeface="Courier New" panose="02070309020205020404" pitchFamily="49" charset="0"/>
+                <a:cs typeface="Courier New" panose="02070309020205020404" pitchFamily="49" charset="0"/>
+              </a:rPr>
+              <a:t>&gt;&gt;&gt;a = 5 </a:t>
+            </a:r>
+          </a:p>
+          <a:p>
+            <a:r>
+              <a:rPr lang="en-US" sz="1400" dirty="0">
+                <a:latin typeface="Courier New" panose="02070309020205020404" pitchFamily="49" charset="0"/>
+                <a:cs typeface="Courier New" panose="02070309020205020404" pitchFamily="49" charset="0"/>
+              </a:rPr>
+              <a:t>&gt;&gt;&gt;a += 5 # same as a = a + 5</a:t>
+            </a:r>
+          </a:p>
+          <a:p>
+            <a:r>
+              <a:rPr lang="en-US" sz="1400" dirty="0">
+                <a:latin typeface="Courier New" panose="02070309020205020404" pitchFamily="49" charset="0"/>
+                <a:cs typeface="Courier New" panose="02070309020205020404" pitchFamily="49" charset="0"/>
+              </a:rPr>
+              <a:t>&gt;&gt;&gt;print(a)</a:t>
+            </a:r>
+          </a:p>
+          <a:p>
+            <a:r>
+              <a:rPr lang="en-US" sz="1400" dirty="0">
+                <a:latin typeface="Courier New" panose="02070309020205020404" pitchFamily="49" charset="0"/>
+                <a:cs typeface="Courier New" panose="02070309020205020404" pitchFamily="49" charset="0"/>
+              </a:rPr>
+              <a:t>10</a:t>
             </a:r>
           </a:p>
         </p:txBody>
@@ -5289,7 +5730,7 @@
     </p:spTree>
     <p:extLst>
       <p:ext uri="{BB962C8B-B14F-4D97-AF65-F5344CB8AC3E}">
-        <p14:creationId xmlns:p14="http://schemas.microsoft.com/office/powerpoint/2010/main" val="437396110"/>
+        <p14:creationId xmlns:p14="http://schemas.microsoft.com/office/powerpoint/2010/main" val="4164762645"/>
       </p:ext>
     </p:extLst>
   </p:cSld>
@@ -5339,17 +5780,17 @@
           <a:p>
             <a:r>
               <a:rPr lang="en-US" dirty="0"/>
-              <a:t>String Operations</a:t>
-            </a:r>
-          </a:p>
-        </p:txBody>
-      </p:sp>
-      <p:sp>
-        <p:nvSpPr>
-          <p:cNvPr id="4" name="TextBox 3">
+              <a:t>Strings</a:t>
+            </a:r>
+          </a:p>
+        </p:txBody>
+      </p:sp>
+      <p:sp>
+        <p:nvSpPr>
+          <p:cNvPr id="3" name="TextBox 2">
             <a:extLst>
               <a:ext uri="{FF2B5EF4-FFF2-40B4-BE49-F238E27FC236}">
-                <a16:creationId xmlns:a16="http://schemas.microsoft.com/office/drawing/2014/main" id="{3220CE55-0EF8-E54D-ADA1-383749BCADB3}"/>
+                <a16:creationId xmlns:a16="http://schemas.microsoft.com/office/drawing/2014/main" id="{6D3B0E03-0AE4-244E-971F-8A8306CFA7E3}"/>
               </a:ext>
             </a:extLst>
           </p:cNvPr>
@@ -5358,8 +5799,8 @@
         </p:nvSpPr>
         <p:spPr>
           <a:xfrm>
-            <a:off x="84082" y="1239173"/>
-            <a:ext cx="4414346" cy="3970318"/>
+            <a:off x="378372" y="2167758"/>
+            <a:ext cx="8040414" cy="3539430"/>
           </a:xfrm>
           <a:prstGeom prst="rect">
             <a:avLst/>
@@ -5373,168 +5814,80 @@
           <a:lstStyle/>
           <a:p>
             <a:r>
-              <a:rPr lang="en-US" sz="1400" dirty="0">
-                <a:latin typeface="Courier New" panose="02070309020205020404" pitchFamily="49" charset="0"/>
-                <a:cs typeface="Courier New" panose="02070309020205020404" pitchFamily="49" charset="0"/>
-              </a:rPr>
-              <a:t>&gt;&gt;&gt;"hello" + "world" # concatenation or string addition</a:t>
-            </a:r>
-          </a:p>
-          <a:p>
-            <a:r>
-              <a:rPr lang="en-US" sz="1400" dirty="0">
-                <a:latin typeface="Courier New" panose="02070309020205020404" pitchFamily="49" charset="0"/>
-                <a:cs typeface="Courier New" panose="02070309020205020404" pitchFamily="49" charset="0"/>
-              </a:rPr>
-              <a:t>'</a:t>
-            </a:r>
-            <a:r>
-              <a:rPr lang="en-US" sz="1400" dirty="0" err="1">
-                <a:latin typeface="Courier New" panose="02070309020205020404" pitchFamily="49" charset="0"/>
-                <a:cs typeface="Courier New" panose="02070309020205020404" pitchFamily="49" charset="0"/>
-              </a:rPr>
-              <a:t>helloworld</a:t>
-            </a:r>
-            <a:r>
-              <a:rPr lang="en-US" sz="1400" dirty="0">
-                <a:latin typeface="Courier New" panose="02070309020205020404" pitchFamily="49" charset="0"/>
-                <a:cs typeface="Courier New" panose="02070309020205020404" pitchFamily="49" charset="0"/>
-              </a:rPr>
-              <a:t>'</a:t>
-            </a:r>
-          </a:p>
-          <a:p>
-            <a:endParaRPr lang="en-US" sz="1400" dirty="0">
-              <a:latin typeface="Courier New" panose="02070309020205020404" pitchFamily="49" charset="0"/>
-              <a:cs typeface="Courier New" panose="02070309020205020404" pitchFamily="49" charset="0"/>
-            </a:endParaRPr>
-          </a:p>
-          <a:p>
-            <a:r>
-              <a:rPr lang="en-US" sz="1400" dirty="0">
-                <a:latin typeface="Courier New" panose="02070309020205020404" pitchFamily="49" charset="0"/>
-                <a:cs typeface="Courier New" panose="02070309020205020404" pitchFamily="49" charset="0"/>
-              </a:rPr>
-              <a:t>&gt;&gt;&gt;"hello"*3 # repetition or string multiplication</a:t>
-            </a:r>
-          </a:p>
-          <a:p>
-            <a:r>
-              <a:rPr lang="en-US" sz="1400" dirty="0">
-                <a:latin typeface="Courier New" panose="02070309020205020404" pitchFamily="49" charset="0"/>
-                <a:cs typeface="Courier New" panose="02070309020205020404" pitchFamily="49" charset="0"/>
-              </a:rPr>
-              <a:t>'</a:t>
-            </a:r>
-            <a:r>
-              <a:rPr lang="en-US" sz="1400" dirty="0" err="1">
-                <a:latin typeface="Courier New" panose="02070309020205020404" pitchFamily="49" charset="0"/>
-                <a:cs typeface="Courier New" panose="02070309020205020404" pitchFamily="49" charset="0"/>
-              </a:rPr>
-              <a:t>hellohellohello</a:t>
-            </a:r>
-            <a:r>
-              <a:rPr lang="en-US" sz="1400" dirty="0">
-                <a:latin typeface="Courier New" panose="02070309020205020404" pitchFamily="49" charset="0"/>
-                <a:cs typeface="Courier New" panose="02070309020205020404" pitchFamily="49" charset="0"/>
-              </a:rPr>
-              <a:t>'</a:t>
-            </a:r>
-          </a:p>
-          <a:p>
-            <a:endParaRPr lang="en-US" sz="1400" dirty="0">
-              <a:latin typeface="Courier New" panose="02070309020205020404" pitchFamily="49" charset="0"/>
-              <a:cs typeface="Courier New" panose="02070309020205020404" pitchFamily="49" charset="0"/>
-            </a:endParaRPr>
-          </a:p>
-          <a:p>
-            <a:r>
-              <a:rPr lang="en-US" sz="1400" dirty="0">
-                <a:latin typeface="Courier New" panose="02070309020205020404" pitchFamily="49" charset="0"/>
-                <a:cs typeface="Courier New" panose="02070309020205020404" pitchFamily="49" charset="0"/>
-              </a:rPr>
-              <a:t>&gt;&gt;&gt;"hello"[0] # indexing, getting a specific character </a:t>
-            </a:r>
-          </a:p>
-          <a:p>
-            <a:r>
-              <a:rPr lang="en-US" sz="1400" dirty="0">
-                <a:latin typeface="Courier New" panose="02070309020205020404" pitchFamily="49" charset="0"/>
-                <a:cs typeface="Courier New" panose="02070309020205020404" pitchFamily="49" charset="0"/>
-              </a:rPr>
-              <a:t>'h'</a:t>
-            </a:r>
-          </a:p>
-          <a:p>
-            <a:endParaRPr lang="en-US" sz="1400" dirty="0">
-              <a:latin typeface="Courier New" panose="02070309020205020404" pitchFamily="49" charset="0"/>
-              <a:cs typeface="Courier New" panose="02070309020205020404" pitchFamily="49" charset="0"/>
-            </a:endParaRPr>
-          </a:p>
-          <a:p>
-            <a:r>
-              <a:rPr lang="en-US" sz="1400" dirty="0">
-                <a:latin typeface="Courier New" panose="02070309020205020404" pitchFamily="49" charset="0"/>
-                <a:cs typeface="Courier New" panose="02070309020205020404" pitchFamily="49" charset="0"/>
-              </a:rPr>
-              <a:t>&gt;&gt;&gt;"hello"[-1] # indexing from the end</a:t>
-            </a:r>
-          </a:p>
-          <a:p>
-            <a:r>
-              <a:rPr lang="en-US" sz="1400" dirty="0">
-                <a:latin typeface="Courier New" panose="02070309020205020404" pitchFamily="49" charset="0"/>
-                <a:cs typeface="Courier New" panose="02070309020205020404" pitchFamily="49" charset="0"/>
-              </a:rPr>
-              <a:t>‘o’</a:t>
-            </a:r>
-          </a:p>
-          <a:p>
-            <a:endParaRPr lang="en-US" sz="1400" dirty="0">
-              <a:latin typeface="Courier New" panose="02070309020205020404" pitchFamily="49" charset="0"/>
-              <a:cs typeface="Courier New" panose="02070309020205020404" pitchFamily="49" charset="0"/>
-            </a:endParaRPr>
-          </a:p>
-          <a:p>
-            <a:r>
-              <a:rPr lang="en-US" sz="1400" dirty="0">
-                <a:latin typeface="Courier New" panose="02070309020205020404" pitchFamily="49" charset="0"/>
-                <a:cs typeface="Courier New" panose="02070309020205020404" pitchFamily="49" charset="0"/>
-              </a:rPr>
-              <a:t>&gt;&gt;&gt;</a:t>
-            </a:r>
-            <a:r>
-              <a:rPr lang="en-US" sz="1400" dirty="0" err="1">
-                <a:latin typeface="Courier New" panose="02070309020205020404" pitchFamily="49" charset="0"/>
-                <a:cs typeface="Courier New" panose="02070309020205020404" pitchFamily="49" charset="0"/>
-              </a:rPr>
-              <a:t>len</a:t>
-            </a:r>
-            <a:r>
-              <a:rPr lang="en-US" sz="1400" dirty="0">
-                <a:latin typeface="Courier New" panose="02070309020205020404" pitchFamily="49" charset="0"/>
-                <a:cs typeface="Courier New" panose="02070309020205020404" pitchFamily="49" charset="0"/>
-              </a:rPr>
-              <a:t>("hello") # get the length or size </a:t>
-            </a:r>
-          </a:p>
-          <a:p>
-            <a:r>
-              <a:rPr lang="en-US" sz="1400" dirty="0">
-                <a:latin typeface="Courier New" panose="02070309020205020404" pitchFamily="49" charset="0"/>
-                <a:cs typeface="Courier New" panose="02070309020205020404" pitchFamily="49" charset="0"/>
-              </a:rPr>
-              <a:t>5</a:t>
-            </a:r>
-          </a:p>
-        </p:txBody>
-      </p:sp>
-      <p:sp>
-        <p:nvSpPr>
-          <p:cNvPr id="5" name="TextBox 4">
+              <a:rPr lang="en-US" sz="2800" dirty="0">
+                <a:latin typeface="Courier New" panose="02070309020205020404" pitchFamily="49" charset="0"/>
+                <a:cs typeface="Courier New" panose="02070309020205020404" pitchFamily="49" charset="0"/>
+              </a:rPr>
+              <a:t># can use 'single quotes' or "double quotes" or """triple quotes"""</a:t>
+            </a:r>
+          </a:p>
+          <a:p>
+            <a:r>
+              <a:rPr lang="en-US" sz="2800" dirty="0">
+                <a:latin typeface="Courier New" panose="02070309020205020404" pitchFamily="49" charset="0"/>
+                <a:cs typeface="Courier New" panose="02070309020205020404" pitchFamily="49" charset="0"/>
+              </a:rPr>
+              <a:t># triple quotes and span multiple lines</a:t>
+            </a:r>
+          </a:p>
+          <a:p>
+            <a:r>
+              <a:rPr lang="en-US" sz="2800" dirty="0">
+                <a:latin typeface="Courier New" panose="02070309020205020404" pitchFamily="49" charset="0"/>
+                <a:cs typeface="Courier New" panose="02070309020205020404" pitchFamily="49" charset="0"/>
+              </a:rPr>
+              <a:t>str_1 = "Hello World"</a:t>
+            </a:r>
+          </a:p>
+          <a:p>
+            <a:r>
+              <a:rPr lang="en-US" sz="2800" dirty="0">
+                <a:latin typeface="Courier New" panose="02070309020205020404" pitchFamily="49" charset="0"/>
+                <a:cs typeface="Courier New" panose="02070309020205020404" pitchFamily="49" charset="0"/>
+              </a:rPr>
+              <a:t>str_2 = '100'</a:t>
+            </a:r>
+          </a:p>
+          <a:p>
+            <a:r>
+              <a:rPr lang="en-US" sz="2800" dirty="0">
+                <a:latin typeface="Courier New" panose="02070309020205020404" pitchFamily="49" charset="0"/>
+                <a:cs typeface="Courier New" panose="02070309020205020404" pitchFamily="49" charset="0"/>
+              </a:rPr>
+              <a:t>str_3 = """</a:t>
+            </a:r>
+            <a:r>
+              <a:rPr lang="en-US" sz="2800" dirty="0" err="1">
+                <a:latin typeface="Courier New" panose="02070309020205020404" pitchFamily="49" charset="0"/>
+                <a:cs typeface="Courier New" panose="02070309020205020404" pitchFamily="49" charset="0"/>
+              </a:rPr>
+              <a:t>sdgwerg</a:t>
+            </a:r>
+            <a:r>
+              <a:rPr lang="en-US" sz="2800" dirty="0">
+                <a:latin typeface="Courier New" panose="02070309020205020404" pitchFamily="49" charset="0"/>
+                <a:cs typeface="Courier New" panose="02070309020205020404" pitchFamily="49" charset="0"/>
+              </a:rPr>
+              <a:t>@#$@</a:t>
+            </a:r>
+          </a:p>
+          <a:p>
+            <a:r>
+              <a:rPr lang="en-US" sz="2800" dirty="0">
+                <a:latin typeface="Courier New" panose="02070309020205020404" pitchFamily="49" charset="0"/>
+                <a:cs typeface="Courier New" panose="02070309020205020404" pitchFamily="49" charset="0"/>
+              </a:rPr>
+              <a:t>			 #$%343 """</a:t>
+            </a:r>
+          </a:p>
+        </p:txBody>
+      </p:sp>
+      <p:sp>
+        <p:nvSpPr>
+          <p:cNvPr id="4" name="TextBox 3">
             <a:extLst>
               <a:ext uri="{FF2B5EF4-FFF2-40B4-BE49-F238E27FC236}">
-                <a16:creationId xmlns:a16="http://schemas.microsoft.com/office/drawing/2014/main" id="{DE0F4AE6-A1A5-FD47-B4A2-0D0203772C9C}"/>
+                <a16:creationId xmlns:a16="http://schemas.microsoft.com/office/drawing/2014/main" id="{46248A77-B36C-D941-99FE-A27742D1BAD3}"/>
               </a:ext>
             </a:extLst>
           </p:cNvPr>
@@ -5543,8 +5896,8 @@
         </p:nvSpPr>
         <p:spPr>
           <a:xfrm>
-            <a:off x="84082" y="5242034"/>
-            <a:ext cx="8686801" cy="923330"/>
+            <a:off x="378372" y="1462087"/>
+            <a:ext cx="8040414" cy="523220"/>
           </a:xfrm>
           <a:prstGeom prst="rect">
             <a:avLst/>
@@ -5558,198 +5911,10 @@
           <a:lstStyle/>
           <a:p>
             <a:r>
-              <a:rPr lang="en-US" dirty="0">
-                <a:latin typeface="Courier New" panose="02070309020205020404" pitchFamily="49" charset="0"/>
-                <a:cs typeface="Courier New" panose="02070309020205020404" pitchFamily="49" charset="0"/>
-              </a:rPr>
-              <a:t>All operations: +, *, &gt;, &lt;, ==, !=, &gt;=, &lt;=, *=, +=</a:t>
-            </a:r>
-          </a:p>
-          <a:p>
-            <a:r>
-              <a:rPr lang="en-US" dirty="0">
-                <a:latin typeface="Courier New" panose="02070309020205020404" pitchFamily="49" charset="0"/>
-                <a:cs typeface="Courier New" panose="02070309020205020404" pitchFamily="49" charset="0"/>
-              </a:rPr>
-              <a:t>.lower(), .upper(), .count(), .index()</a:t>
-            </a:r>
-          </a:p>
-          <a:p>
-            <a:r>
-              <a:rPr lang="en-US" dirty="0">
-                <a:latin typeface="Courier New" panose="02070309020205020404" pitchFamily="49" charset="0"/>
-                <a:cs typeface="Courier New" panose="02070309020205020404" pitchFamily="49" charset="0"/>
-              </a:rPr>
-              <a:t>Take 5 mins to try some operations, are there any surprises?</a:t>
-            </a:r>
-          </a:p>
-        </p:txBody>
-      </p:sp>
-      <p:sp>
-        <p:nvSpPr>
-          <p:cNvPr id="6" name="TextBox 5">
-            <a:extLst>
-              <a:ext uri="{FF2B5EF4-FFF2-40B4-BE49-F238E27FC236}">
-                <a16:creationId xmlns:a16="http://schemas.microsoft.com/office/drawing/2014/main" id="{2BC70847-7038-7B40-88E9-508A0A4BD85D}"/>
-              </a:ext>
-            </a:extLst>
-          </p:cNvPr>
-          <p:cNvSpPr txBox="1"/>
-          <p:nvPr/>
-        </p:nvSpPr>
-        <p:spPr>
-          <a:xfrm>
-            <a:off x="4729654" y="1259148"/>
-            <a:ext cx="4414346" cy="3754874"/>
-          </a:xfrm>
-          <a:prstGeom prst="rect">
-            <a:avLst/>
-          </a:prstGeom>
-          <a:noFill/>
-        </p:spPr>
-        <p:txBody>
-          <a:bodyPr wrap="square" rtlCol="0">
-            <a:spAutoFit/>
-          </a:bodyPr>
-          <a:lstStyle/>
-          <a:p>
-            <a:r>
-              <a:rPr lang="en-US" sz="1400" dirty="0">
-                <a:latin typeface="Courier New" panose="02070309020205020404" pitchFamily="49" charset="0"/>
-                <a:cs typeface="Courier New" panose="02070309020205020404" pitchFamily="49" charset="0"/>
-              </a:rPr>
-              <a:t>&gt;&gt;&gt;"hello" &lt; "</a:t>
-            </a:r>
-            <a:r>
-              <a:rPr lang="en-US" sz="1400" dirty="0" err="1">
-                <a:latin typeface="Courier New" panose="02070309020205020404" pitchFamily="49" charset="0"/>
-                <a:cs typeface="Courier New" panose="02070309020205020404" pitchFamily="49" charset="0"/>
-              </a:rPr>
-              <a:t>jello</a:t>
-            </a:r>
-            <a:r>
-              <a:rPr lang="en-US" sz="1400" dirty="0">
-                <a:latin typeface="Courier New" panose="02070309020205020404" pitchFamily="49" charset="0"/>
-                <a:cs typeface="Courier New" panose="02070309020205020404" pitchFamily="49" charset="0"/>
-              </a:rPr>
-              <a:t>" # comparison, compares each letter at a time, the letter that later in the alphabet is 'larger'</a:t>
-            </a:r>
-          </a:p>
-          <a:p>
-            <a:r>
-              <a:rPr lang="en-US" sz="1400" dirty="0">
-                <a:latin typeface="Courier New" panose="02070309020205020404" pitchFamily="49" charset="0"/>
-                <a:cs typeface="Courier New" panose="02070309020205020404" pitchFamily="49" charset="0"/>
-              </a:rPr>
-              <a:t>True</a:t>
-            </a:r>
-          </a:p>
-          <a:p>
-            <a:endParaRPr lang="en-US" sz="1400" dirty="0">
-              <a:latin typeface="Courier New" panose="02070309020205020404" pitchFamily="49" charset="0"/>
-              <a:cs typeface="Courier New" panose="02070309020205020404" pitchFamily="49" charset="0"/>
-            </a:endParaRPr>
-          </a:p>
-          <a:p>
-            <a:r>
-              <a:rPr lang="en-US" sz="1400" dirty="0">
-                <a:latin typeface="Courier New" panose="02070309020205020404" pitchFamily="49" charset="0"/>
-                <a:cs typeface="Courier New" panose="02070309020205020404" pitchFamily="49" charset="0"/>
-              </a:rPr>
-              <a:t>&gt;&gt;&gt;2 &gt;= 2 # greater or equal </a:t>
-            </a:r>
-          </a:p>
-          <a:p>
-            <a:r>
-              <a:rPr lang="en-US" sz="1400" dirty="0">
-                <a:latin typeface="Courier New" panose="02070309020205020404" pitchFamily="49" charset="0"/>
-                <a:cs typeface="Courier New" panose="02070309020205020404" pitchFamily="49" charset="0"/>
-              </a:rPr>
-              <a:t>True</a:t>
-            </a:r>
-          </a:p>
-          <a:p>
-            <a:endParaRPr lang="en-US" sz="1400" dirty="0">
-              <a:latin typeface="Courier New" panose="02070309020205020404" pitchFamily="49" charset="0"/>
-              <a:cs typeface="Courier New" panose="02070309020205020404" pitchFamily="49" charset="0"/>
-            </a:endParaRPr>
-          </a:p>
-          <a:p>
-            <a:r>
-              <a:rPr lang="en-US" sz="1400" dirty="0">
-                <a:latin typeface="Courier New" panose="02070309020205020404" pitchFamily="49" charset="0"/>
-                <a:cs typeface="Courier New" panose="02070309020205020404" pitchFamily="49" charset="0"/>
-              </a:rPr>
-              <a:t>&gt;&gt;&gt;a = 5 </a:t>
-            </a:r>
-          </a:p>
-          <a:p>
-            <a:r>
-              <a:rPr lang="en-US" sz="1400" dirty="0">
-                <a:latin typeface="Courier New" panose="02070309020205020404" pitchFamily="49" charset="0"/>
-                <a:cs typeface="Courier New" panose="02070309020205020404" pitchFamily="49" charset="0"/>
-              </a:rPr>
-              <a:t>&gt;&gt;&gt;a += 5 # same as a = a + 5</a:t>
-            </a:r>
-          </a:p>
-          <a:p>
-            <a:r>
-              <a:rPr lang="en-US" sz="1400" dirty="0">
-                <a:latin typeface="Courier New" panose="02070309020205020404" pitchFamily="49" charset="0"/>
-                <a:cs typeface="Courier New" panose="02070309020205020404" pitchFamily="49" charset="0"/>
-              </a:rPr>
-              <a:t>&gt;&gt;&gt;print(a)</a:t>
-            </a:r>
-          </a:p>
-          <a:p>
-            <a:r>
-              <a:rPr lang="en-US" sz="1400" dirty="0">
-                <a:latin typeface="Courier New" panose="02070309020205020404" pitchFamily="49" charset="0"/>
-                <a:cs typeface="Courier New" panose="02070309020205020404" pitchFamily="49" charset="0"/>
-              </a:rPr>
-              <a:t>10</a:t>
-            </a:r>
-          </a:p>
-          <a:p>
-            <a:endParaRPr lang="en-US" sz="1400" dirty="0">
-              <a:latin typeface="Courier New" panose="02070309020205020404" pitchFamily="49" charset="0"/>
-              <a:cs typeface="Courier New" panose="02070309020205020404" pitchFamily="49" charset="0"/>
-            </a:endParaRPr>
-          </a:p>
-          <a:p>
-            <a:r>
-              <a:rPr lang="en-US" sz="1400" dirty="0">
-                <a:latin typeface="Courier New" panose="02070309020205020404" pitchFamily="49" charset="0"/>
-                <a:cs typeface="Courier New" panose="02070309020205020404" pitchFamily="49" charset="0"/>
-              </a:rPr>
-              <a:t>&gt;&gt;&gt;”</a:t>
-            </a:r>
-            <a:r>
-              <a:rPr lang="en-US" sz="1400" dirty="0" err="1">
-                <a:latin typeface="Courier New" panose="02070309020205020404" pitchFamily="49" charset="0"/>
-                <a:cs typeface="Courier New" panose="02070309020205020404" pitchFamily="49" charset="0"/>
-              </a:rPr>
-              <a:t>hello”.upper</a:t>
-            </a:r>
-            <a:r>
-              <a:rPr lang="en-US" sz="1400" dirty="0">
-                <a:latin typeface="Courier New" panose="02070309020205020404" pitchFamily="49" charset="0"/>
-                <a:cs typeface="Courier New" panose="02070309020205020404" pitchFamily="49" charset="0"/>
-              </a:rPr>
-              <a:t>() # all characters become uppercase</a:t>
-            </a:r>
-            <a:br>
-              <a:rPr lang="en-US" sz="1400" dirty="0">
-                <a:latin typeface="Courier New" panose="02070309020205020404" pitchFamily="49" charset="0"/>
-                <a:cs typeface="Courier New" panose="02070309020205020404" pitchFamily="49" charset="0"/>
-              </a:rPr>
-            </a:br>
-            <a:r>
-              <a:rPr lang="en-US" sz="1400" dirty="0">
-                <a:latin typeface="Courier New" panose="02070309020205020404" pitchFamily="49" charset="0"/>
-                <a:cs typeface="Courier New" panose="02070309020205020404" pitchFamily="49" charset="0"/>
-              </a:rPr>
-              <a:t>’HELLO’</a:t>
+              <a:rPr lang="en-US" sz="2800" dirty="0">
+                <a:latin typeface="Helvetica Light" panose="020B0403020202020204" pitchFamily="34" charset="0"/>
+              </a:rPr>
+              <a:t>Strings store text or any series of characters</a:t>
             </a:r>
           </a:p>
         </p:txBody>
@@ -5757,7 +5922,7 @@
     </p:spTree>
     <p:extLst>
       <p:ext uri="{BB962C8B-B14F-4D97-AF65-F5344CB8AC3E}">
-        <p14:creationId xmlns:p14="http://schemas.microsoft.com/office/powerpoint/2010/main" val="1506647160"/>
+        <p14:creationId xmlns:p14="http://schemas.microsoft.com/office/powerpoint/2010/main" val="437396110"/>
       </p:ext>
     </p:extLst>
   </p:cSld>
@@ -5807,7 +5972,7 @@
           <a:p>
             <a:r>
               <a:rPr lang="en-US" dirty="0"/>
-              <a:t>Introduction to control structures and indentation</a:t>
+              <a:t>String Operations</a:t>
             </a:r>
           </a:p>
         </p:txBody>
@@ -5817,7 +5982,7 @@
           <p:cNvPr id="4" name="TextBox 3">
             <a:extLst>
               <a:ext uri="{FF2B5EF4-FFF2-40B4-BE49-F238E27FC236}">
-                <a16:creationId xmlns:a16="http://schemas.microsoft.com/office/drawing/2014/main" id="{46248A77-B36C-D941-99FE-A27742D1BAD3}"/>
+                <a16:creationId xmlns:a16="http://schemas.microsoft.com/office/drawing/2014/main" id="{3220CE55-0EF8-E54D-ADA1-383749BCADB3}"/>
               </a:ext>
             </a:extLst>
           </p:cNvPr>
@@ -5826,8 +5991,8 @@
         </p:nvSpPr>
         <p:spPr>
           <a:xfrm>
-            <a:off x="367862" y="1376148"/>
-            <a:ext cx="8040414" cy="954107"/>
+            <a:off x="84082" y="1239173"/>
+            <a:ext cx="4414346" cy="3970318"/>
           </a:xfrm>
           <a:prstGeom prst="rect">
             <a:avLst/>
@@ -5841,20 +6006,168 @@
           <a:lstStyle/>
           <a:p>
             <a:r>
-              <a:rPr lang="en-US" sz="2800" dirty="0">
-                <a:latin typeface="Helvetica Light" panose="020B0403020202020204" pitchFamily="34" charset="0"/>
-              </a:rPr>
-              <a:t>if statements allow decisions to be made based on the resultant values of conditionals</a:t>
-            </a:r>
-          </a:p>
-        </p:txBody>
-      </p:sp>
-      <p:sp>
-        <p:nvSpPr>
-          <p:cNvPr id="6" name="TextBox 5">
+              <a:rPr lang="en-US" sz="1400" dirty="0">
+                <a:latin typeface="Courier New" panose="02070309020205020404" pitchFamily="49" charset="0"/>
+                <a:cs typeface="Courier New" panose="02070309020205020404" pitchFamily="49" charset="0"/>
+              </a:rPr>
+              <a:t>&gt;&gt;&gt;"hello" + "world" # concatenation or string addition</a:t>
+            </a:r>
+          </a:p>
+          <a:p>
+            <a:r>
+              <a:rPr lang="en-US" sz="1400" dirty="0">
+                <a:latin typeface="Courier New" panose="02070309020205020404" pitchFamily="49" charset="0"/>
+                <a:cs typeface="Courier New" panose="02070309020205020404" pitchFamily="49" charset="0"/>
+              </a:rPr>
+              <a:t>'</a:t>
+            </a:r>
+            <a:r>
+              <a:rPr lang="en-US" sz="1400" dirty="0" err="1">
+                <a:latin typeface="Courier New" panose="02070309020205020404" pitchFamily="49" charset="0"/>
+                <a:cs typeface="Courier New" panose="02070309020205020404" pitchFamily="49" charset="0"/>
+              </a:rPr>
+              <a:t>helloworld</a:t>
+            </a:r>
+            <a:r>
+              <a:rPr lang="en-US" sz="1400" dirty="0">
+                <a:latin typeface="Courier New" panose="02070309020205020404" pitchFamily="49" charset="0"/>
+                <a:cs typeface="Courier New" panose="02070309020205020404" pitchFamily="49" charset="0"/>
+              </a:rPr>
+              <a:t>'</a:t>
+            </a:r>
+          </a:p>
+          <a:p>
+            <a:endParaRPr lang="en-US" sz="1400" dirty="0">
+              <a:latin typeface="Courier New" panose="02070309020205020404" pitchFamily="49" charset="0"/>
+              <a:cs typeface="Courier New" panose="02070309020205020404" pitchFamily="49" charset="0"/>
+            </a:endParaRPr>
+          </a:p>
+          <a:p>
+            <a:r>
+              <a:rPr lang="en-US" sz="1400" dirty="0">
+                <a:latin typeface="Courier New" panose="02070309020205020404" pitchFamily="49" charset="0"/>
+                <a:cs typeface="Courier New" panose="02070309020205020404" pitchFamily="49" charset="0"/>
+              </a:rPr>
+              <a:t>&gt;&gt;&gt;"hello"*3 # repetition or string multiplication</a:t>
+            </a:r>
+          </a:p>
+          <a:p>
+            <a:r>
+              <a:rPr lang="en-US" sz="1400" dirty="0">
+                <a:latin typeface="Courier New" panose="02070309020205020404" pitchFamily="49" charset="0"/>
+                <a:cs typeface="Courier New" panose="02070309020205020404" pitchFamily="49" charset="0"/>
+              </a:rPr>
+              <a:t>'</a:t>
+            </a:r>
+            <a:r>
+              <a:rPr lang="en-US" sz="1400" dirty="0" err="1">
+                <a:latin typeface="Courier New" panose="02070309020205020404" pitchFamily="49" charset="0"/>
+                <a:cs typeface="Courier New" panose="02070309020205020404" pitchFamily="49" charset="0"/>
+              </a:rPr>
+              <a:t>hellohellohello</a:t>
+            </a:r>
+            <a:r>
+              <a:rPr lang="en-US" sz="1400" dirty="0">
+                <a:latin typeface="Courier New" panose="02070309020205020404" pitchFamily="49" charset="0"/>
+                <a:cs typeface="Courier New" panose="02070309020205020404" pitchFamily="49" charset="0"/>
+              </a:rPr>
+              <a:t>'</a:t>
+            </a:r>
+          </a:p>
+          <a:p>
+            <a:endParaRPr lang="en-US" sz="1400" dirty="0">
+              <a:latin typeface="Courier New" panose="02070309020205020404" pitchFamily="49" charset="0"/>
+              <a:cs typeface="Courier New" panose="02070309020205020404" pitchFamily="49" charset="0"/>
+            </a:endParaRPr>
+          </a:p>
+          <a:p>
+            <a:r>
+              <a:rPr lang="en-US" sz="1400" dirty="0">
+                <a:latin typeface="Courier New" panose="02070309020205020404" pitchFamily="49" charset="0"/>
+                <a:cs typeface="Courier New" panose="02070309020205020404" pitchFamily="49" charset="0"/>
+              </a:rPr>
+              <a:t>&gt;&gt;&gt;"hello"[0] # indexing, getting a specific character </a:t>
+            </a:r>
+          </a:p>
+          <a:p>
+            <a:r>
+              <a:rPr lang="en-US" sz="1400" dirty="0">
+                <a:latin typeface="Courier New" panose="02070309020205020404" pitchFamily="49" charset="0"/>
+                <a:cs typeface="Courier New" panose="02070309020205020404" pitchFamily="49" charset="0"/>
+              </a:rPr>
+              <a:t>'h'</a:t>
+            </a:r>
+          </a:p>
+          <a:p>
+            <a:endParaRPr lang="en-US" sz="1400" dirty="0">
+              <a:latin typeface="Courier New" panose="02070309020205020404" pitchFamily="49" charset="0"/>
+              <a:cs typeface="Courier New" panose="02070309020205020404" pitchFamily="49" charset="0"/>
+            </a:endParaRPr>
+          </a:p>
+          <a:p>
+            <a:r>
+              <a:rPr lang="en-US" sz="1400" dirty="0">
+                <a:latin typeface="Courier New" panose="02070309020205020404" pitchFamily="49" charset="0"/>
+                <a:cs typeface="Courier New" panose="02070309020205020404" pitchFamily="49" charset="0"/>
+              </a:rPr>
+              <a:t>&gt;&gt;&gt;"hello"[-1] # indexing from the end</a:t>
+            </a:r>
+          </a:p>
+          <a:p>
+            <a:r>
+              <a:rPr lang="en-US" sz="1400" dirty="0">
+                <a:latin typeface="Courier New" panose="02070309020205020404" pitchFamily="49" charset="0"/>
+                <a:cs typeface="Courier New" panose="02070309020205020404" pitchFamily="49" charset="0"/>
+              </a:rPr>
+              <a:t>‘o’</a:t>
+            </a:r>
+          </a:p>
+          <a:p>
+            <a:endParaRPr lang="en-US" sz="1400" dirty="0">
+              <a:latin typeface="Courier New" panose="02070309020205020404" pitchFamily="49" charset="0"/>
+              <a:cs typeface="Courier New" panose="02070309020205020404" pitchFamily="49" charset="0"/>
+            </a:endParaRPr>
+          </a:p>
+          <a:p>
+            <a:r>
+              <a:rPr lang="en-US" sz="1400" dirty="0">
+                <a:latin typeface="Courier New" panose="02070309020205020404" pitchFamily="49" charset="0"/>
+                <a:cs typeface="Courier New" panose="02070309020205020404" pitchFamily="49" charset="0"/>
+              </a:rPr>
+              <a:t>&gt;&gt;&gt;</a:t>
+            </a:r>
+            <a:r>
+              <a:rPr lang="en-US" sz="1400" dirty="0" err="1">
+                <a:latin typeface="Courier New" panose="02070309020205020404" pitchFamily="49" charset="0"/>
+                <a:cs typeface="Courier New" panose="02070309020205020404" pitchFamily="49" charset="0"/>
+              </a:rPr>
+              <a:t>len</a:t>
+            </a:r>
+            <a:r>
+              <a:rPr lang="en-US" sz="1400" dirty="0">
+                <a:latin typeface="Courier New" panose="02070309020205020404" pitchFamily="49" charset="0"/>
+                <a:cs typeface="Courier New" panose="02070309020205020404" pitchFamily="49" charset="0"/>
+              </a:rPr>
+              <a:t>("hello") # get the length or size </a:t>
+            </a:r>
+          </a:p>
+          <a:p>
+            <a:r>
+              <a:rPr lang="en-US" sz="1400" dirty="0">
+                <a:latin typeface="Courier New" panose="02070309020205020404" pitchFamily="49" charset="0"/>
+                <a:cs typeface="Courier New" panose="02070309020205020404" pitchFamily="49" charset="0"/>
+              </a:rPr>
+              <a:t>5</a:t>
+            </a:r>
+          </a:p>
+        </p:txBody>
+      </p:sp>
+      <p:sp>
+        <p:nvSpPr>
+          <p:cNvPr id="5" name="TextBox 4">
             <a:extLst>
               <a:ext uri="{FF2B5EF4-FFF2-40B4-BE49-F238E27FC236}">
-                <a16:creationId xmlns:a16="http://schemas.microsoft.com/office/drawing/2014/main" id="{C476E3F5-273D-FE4B-8977-896A1083CF41}"/>
+                <a16:creationId xmlns:a16="http://schemas.microsoft.com/office/drawing/2014/main" id="{DE0F4AE6-A1A5-FD47-B4A2-0D0203772C9C}"/>
               </a:ext>
             </a:extLst>
           </p:cNvPr>
@@ -5863,8 +6176,8 @@
         </p:nvSpPr>
         <p:spPr>
           <a:xfrm>
-            <a:off x="367862" y="2535715"/>
-            <a:ext cx="4414346" cy="4185761"/>
+            <a:off x="84082" y="5242034"/>
+            <a:ext cx="8686801" cy="923330"/>
           </a:xfrm>
           <a:prstGeom prst="rect">
             <a:avLst/>
@@ -5878,148 +6191,39 @@
           <a:lstStyle/>
           <a:p>
             <a:r>
-              <a:rPr lang="en-US" sz="1400" dirty="0">
-                <a:latin typeface="Courier New" panose="02070309020205020404" pitchFamily="49" charset="0"/>
-                <a:cs typeface="Courier New" panose="02070309020205020404" pitchFamily="49" charset="0"/>
-              </a:rPr>
-              <a:t>if 5 &gt; 2: #5 is greater than 2 so will execute statement within the if statement. Statements within the if statement are tabbed </a:t>
-            </a:r>
-          </a:p>
-          <a:p>
-            <a:r>
-              <a:rPr lang="en-US" sz="1400" dirty="0">
-                <a:latin typeface="Courier New" panose="02070309020205020404" pitchFamily="49" charset="0"/>
-                <a:cs typeface="Courier New" panose="02070309020205020404" pitchFamily="49" charset="0"/>
-              </a:rPr>
-              <a:t>...     print("this is always true")</a:t>
-            </a:r>
-          </a:p>
-          <a:p>
-            <a:r>
-              <a:rPr lang="en-US" sz="1400" dirty="0">
-                <a:latin typeface="Courier New" panose="02070309020205020404" pitchFamily="49" charset="0"/>
-                <a:cs typeface="Courier New" panose="02070309020205020404" pitchFamily="49" charset="0"/>
-              </a:rPr>
-              <a:t>... </a:t>
-            </a:r>
-          </a:p>
-          <a:p>
-            <a:r>
-              <a:rPr lang="en-US" sz="1400" dirty="0">
-                <a:latin typeface="Courier New" panose="02070309020205020404" pitchFamily="49" charset="0"/>
-                <a:cs typeface="Courier New" panose="02070309020205020404" pitchFamily="49" charset="0"/>
-              </a:rPr>
-              <a:t>this is always true</a:t>
-            </a:r>
-          </a:p>
-          <a:p>
-            <a:endParaRPr lang="en-US" sz="1400" dirty="0">
-              <a:latin typeface="Courier New" panose="02070309020205020404" pitchFamily="49" charset="0"/>
-              <a:cs typeface="Courier New" panose="02070309020205020404" pitchFamily="49" charset="0"/>
-            </a:endParaRPr>
-          </a:p>
-          <a:p>
-            <a:r>
-              <a:rPr lang="en-US" sz="1400" dirty="0">
-                <a:latin typeface="Courier New" panose="02070309020205020404" pitchFamily="49" charset="0"/>
-                <a:cs typeface="Courier New" panose="02070309020205020404" pitchFamily="49" charset="0"/>
-              </a:rPr>
-              <a:t>&gt;&gt;&gt;if 5 &gt; 2:</a:t>
-            </a:r>
-          </a:p>
-          <a:p>
-            <a:r>
-              <a:rPr lang="en-US" sz="1400" dirty="0">
-                <a:latin typeface="Courier New" panose="02070309020205020404" pitchFamily="49" charset="0"/>
-                <a:cs typeface="Courier New" panose="02070309020205020404" pitchFamily="49" charset="0"/>
-              </a:rPr>
-              <a:t>...print("wrong")</a:t>
-            </a:r>
-          </a:p>
-          <a:p>
-            <a:r>
-              <a:rPr lang="en-US" sz="1400" dirty="0">
-                <a:latin typeface="Courier New" panose="02070309020205020404" pitchFamily="49" charset="0"/>
-                <a:cs typeface="Courier New" panose="02070309020205020404" pitchFamily="49" charset="0"/>
-              </a:rPr>
-              <a:t>  File "&lt;stdin&gt;", line 2</a:t>
-            </a:r>
-          </a:p>
-          <a:p>
-            <a:r>
-              <a:rPr lang="en-US" sz="1400" dirty="0">
-                <a:latin typeface="Courier New" panose="02070309020205020404" pitchFamily="49" charset="0"/>
-                <a:cs typeface="Courier New" panose="02070309020205020404" pitchFamily="49" charset="0"/>
-              </a:rPr>
-              <a:t>    print("wrong")</a:t>
-            </a:r>
-          </a:p>
-          <a:p>
-            <a:r>
-              <a:rPr lang="en-US" sz="1400" dirty="0">
-                <a:latin typeface="Courier New" panose="02070309020205020404" pitchFamily="49" charset="0"/>
-                <a:cs typeface="Courier New" panose="02070309020205020404" pitchFamily="49" charset="0"/>
-              </a:rPr>
-              <a:t>        ^</a:t>
-            </a:r>
-          </a:p>
-          <a:p>
-            <a:r>
-              <a:rPr lang="en-US" sz="1400" dirty="0" err="1">
-                <a:latin typeface="Courier New" panose="02070309020205020404" pitchFamily="49" charset="0"/>
-                <a:cs typeface="Courier New" panose="02070309020205020404" pitchFamily="49" charset="0"/>
-              </a:rPr>
-              <a:t>IndentationError</a:t>
-            </a:r>
-            <a:r>
-              <a:rPr lang="en-US" sz="1400" dirty="0">
-                <a:latin typeface="Courier New" panose="02070309020205020404" pitchFamily="49" charset="0"/>
-                <a:cs typeface="Courier New" panose="02070309020205020404" pitchFamily="49" charset="0"/>
-              </a:rPr>
-              <a:t>: expected an indented block</a:t>
-            </a:r>
-          </a:p>
-          <a:p>
-            <a:endParaRPr lang="en-US" sz="1400" dirty="0">
-              <a:latin typeface="Courier New" panose="02070309020205020404" pitchFamily="49" charset="0"/>
-              <a:cs typeface="Courier New" panose="02070309020205020404" pitchFamily="49" charset="0"/>
-            </a:endParaRPr>
-          </a:p>
-          <a:p>
-            <a:r>
-              <a:rPr lang="en-US" sz="1400" dirty="0">
-                <a:latin typeface="Courier New" panose="02070309020205020404" pitchFamily="49" charset="0"/>
-                <a:cs typeface="Courier New" panose="02070309020205020404" pitchFamily="49" charset="0"/>
-              </a:rPr>
-              <a:t>&gt;&gt;&gt;if 5 &gt; 2:</a:t>
-            </a:r>
-          </a:p>
-          <a:p>
-            <a:r>
-              <a:rPr lang="en-US" sz="1400" dirty="0">
-                <a:latin typeface="Courier New" panose="02070309020205020404" pitchFamily="49" charset="0"/>
-                <a:cs typeface="Courier New" panose="02070309020205020404" pitchFamily="49" charset="0"/>
-              </a:rPr>
-              <a:t>...  print("correct tabbing")</a:t>
-            </a:r>
-          </a:p>
-          <a:p>
-            <a:r>
-              <a:rPr lang="en-US" sz="1400" dirty="0">
-                <a:latin typeface="Courier New" panose="02070309020205020404" pitchFamily="49" charset="0"/>
-                <a:cs typeface="Courier New" panose="02070309020205020404" pitchFamily="49" charset="0"/>
-              </a:rPr>
-              <a:t>correct tabbing</a:t>
-            </a:r>
-          </a:p>
-        </p:txBody>
-      </p:sp>
-      <p:sp>
-        <p:nvSpPr>
-          <p:cNvPr id="7" name="TextBox 6">
+              <a:rPr lang="en-US" dirty="0">
+                <a:latin typeface="Courier New" panose="02070309020205020404" pitchFamily="49" charset="0"/>
+                <a:cs typeface="Courier New" panose="02070309020205020404" pitchFamily="49" charset="0"/>
+              </a:rPr>
+              <a:t>All operations: +, *, &gt;, &lt;, ==, !=, &gt;=, &lt;=, *=, +=</a:t>
+            </a:r>
+          </a:p>
+          <a:p>
+            <a:r>
+              <a:rPr lang="en-US" dirty="0">
+                <a:latin typeface="Courier New" panose="02070309020205020404" pitchFamily="49" charset="0"/>
+                <a:cs typeface="Courier New" panose="02070309020205020404" pitchFamily="49" charset="0"/>
+              </a:rPr>
+              <a:t>.lower(), .upper(), .count(), .index()</a:t>
+            </a:r>
+          </a:p>
+          <a:p>
+            <a:r>
+              <a:rPr lang="en-US" dirty="0">
+                <a:latin typeface="Courier New" panose="02070309020205020404" pitchFamily="49" charset="0"/>
+                <a:cs typeface="Courier New" panose="02070309020205020404" pitchFamily="49" charset="0"/>
+              </a:rPr>
+              <a:t>Take 5 mins to try some operations, are there any surprises?</a:t>
+            </a:r>
+          </a:p>
+        </p:txBody>
+      </p:sp>
+      <p:sp>
+        <p:nvSpPr>
+          <p:cNvPr id="6" name="TextBox 5">
             <a:extLst>
               <a:ext uri="{FF2B5EF4-FFF2-40B4-BE49-F238E27FC236}">
-                <a16:creationId xmlns:a16="http://schemas.microsoft.com/office/drawing/2014/main" id="{0127582C-8F3D-6746-AA17-ACC9CC61EE9A}"/>
+                <a16:creationId xmlns:a16="http://schemas.microsoft.com/office/drawing/2014/main" id="{2BC70847-7038-7B40-88E9-508A0A4BD85D}"/>
               </a:ext>
             </a:extLst>
           </p:cNvPr>
@@ -6028,8 +6232,8 @@
         </p:nvSpPr>
         <p:spPr>
           <a:xfrm>
-            <a:off x="4729654" y="2427992"/>
-            <a:ext cx="4414346" cy="4401205"/>
+            <a:off x="4729654" y="1259148"/>
+            <a:ext cx="4414346" cy="3754874"/>
           </a:xfrm>
           <a:prstGeom prst="rect">
             <a:avLst/>
@@ -6047,61 +6251,30 @@
                 <a:latin typeface="Courier New" panose="02070309020205020404" pitchFamily="49" charset="0"/>
                 <a:cs typeface="Courier New" panose="02070309020205020404" pitchFamily="49" charset="0"/>
               </a:rPr>
-              <a:t># if statements can be paired with else statements, </a:t>
-            </a:r>
-          </a:p>
-          <a:p>
-            <a:r>
-              <a:rPr lang="en-US" sz="1400" dirty="0">
-                <a:latin typeface="Courier New" panose="02070309020205020404" pitchFamily="49" charset="0"/>
-                <a:cs typeface="Courier New" panose="02070309020205020404" pitchFamily="49" charset="0"/>
-              </a:rPr>
-              <a:t>&gt;&gt;&gt;if 2 &gt; 5:</a:t>
-            </a:r>
-          </a:p>
-          <a:p>
-            <a:r>
-              <a:rPr lang="en-US" sz="1400" dirty="0">
-                <a:latin typeface="Courier New" panose="02070309020205020404" pitchFamily="49" charset="0"/>
-                <a:cs typeface="Courier New" panose="02070309020205020404" pitchFamily="49" charset="0"/>
-              </a:rPr>
-              <a:t>...   print("will not execute")</a:t>
-            </a:r>
-          </a:p>
-          <a:p>
-            <a:r>
-              <a:rPr lang="en-US" sz="1400" dirty="0">
-                <a:latin typeface="Courier New" panose="02070309020205020404" pitchFamily="49" charset="0"/>
-                <a:cs typeface="Courier New" panose="02070309020205020404" pitchFamily="49" charset="0"/>
-              </a:rPr>
-              <a:t>...else:</a:t>
-            </a:r>
-          </a:p>
-          <a:p>
-            <a:r>
-              <a:rPr lang="en-US" sz="1400" dirty="0">
-                <a:latin typeface="Courier New" panose="02070309020205020404" pitchFamily="49" charset="0"/>
-                <a:cs typeface="Courier New" panose="02070309020205020404" pitchFamily="49" charset="0"/>
-              </a:rPr>
-              <a:t>...   print("will execute")</a:t>
-            </a:r>
-          </a:p>
-          <a:p>
-            <a:r>
-              <a:rPr lang="en-US" sz="1400" dirty="0">
-                <a:latin typeface="Courier New" panose="02070309020205020404" pitchFamily="49" charset="0"/>
-                <a:cs typeface="Courier New" panose="02070309020205020404" pitchFamily="49" charset="0"/>
-              </a:rPr>
-              <a:t>...</a:t>
-            </a:r>
-          </a:p>
-          <a:p>
-            <a:r>
-              <a:rPr lang="en-US" sz="1400" dirty="0">
-                <a:latin typeface="Courier New" panose="02070309020205020404" pitchFamily="49" charset="0"/>
-                <a:cs typeface="Courier New" panose="02070309020205020404" pitchFamily="49" charset="0"/>
-              </a:rPr>
-              <a:t>will execute</a:t>
+              <a:t>&gt;&gt;&gt;"hello" &lt; "</a:t>
+            </a:r>
+            <a:r>
+              <a:rPr lang="en-US" sz="1400" dirty="0" err="1">
+                <a:latin typeface="Courier New" panose="02070309020205020404" pitchFamily="49" charset="0"/>
+                <a:cs typeface="Courier New" panose="02070309020205020404" pitchFamily="49" charset="0"/>
+              </a:rPr>
+              <a:t>jello</a:t>
+            </a:r>
+            <a:r>
+              <a:rPr lang="en-US" sz="1400" dirty="0">
+                <a:latin typeface="Courier New" panose="02070309020205020404" pitchFamily="49" charset="0"/>
+                <a:cs typeface="Courier New" panose="02070309020205020404" pitchFamily="49" charset="0"/>
+              </a:rPr>
+              <a:t>" # comparison, compares each letter at a time, the letter that later in the alphabet is 'larger'</a:t>
+            </a:r>
+          </a:p>
+          <a:p>
+            <a:r>
+              <a:rPr lang="en-US" sz="1400" dirty="0">
+                <a:latin typeface="Courier New" panose="02070309020205020404" pitchFamily="49" charset="0"/>
+                <a:cs typeface="Courier New" panose="02070309020205020404" pitchFamily="49" charset="0"/>
+              </a:rPr>
+              <a:t>True</a:t>
             </a:r>
           </a:p>
           <a:p>
@@ -6116,107 +6289,100 @@
                 <a:latin typeface="Courier New" panose="02070309020205020404" pitchFamily="49" charset="0"/>
                 <a:cs typeface="Courier New" panose="02070309020205020404" pitchFamily="49" charset="0"/>
               </a:rPr>
-              <a:t># if statements can also include </a:t>
+              <a:t>&gt;&gt;&gt;2 &gt;= 2 # greater or equal </a:t>
+            </a:r>
+          </a:p>
+          <a:p>
+            <a:r>
+              <a:rPr lang="en-US" sz="1400" dirty="0">
+                <a:latin typeface="Courier New" panose="02070309020205020404" pitchFamily="49" charset="0"/>
+                <a:cs typeface="Courier New" panose="02070309020205020404" pitchFamily="49" charset="0"/>
+              </a:rPr>
+              <a:t>True</a:t>
+            </a:r>
+          </a:p>
+          <a:p>
+            <a:endParaRPr lang="en-US" sz="1400" dirty="0">
+              <a:latin typeface="Courier New" panose="02070309020205020404" pitchFamily="49" charset="0"/>
+              <a:cs typeface="Courier New" panose="02070309020205020404" pitchFamily="49" charset="0"/>
+            </a:endParaRPr>
+          </a:p>
+          <a:p>
+            <a:r>
+              <a:rPr lang="en-US" sz="1400" dirty="0">
+                <a:latin typeface="Courier New" panose="02070309020205020404" pitchFamily="49" charset="0"/>
+                <a:cs typeface="Courier New" panose="02070309020205020404" pitchFamily="49" charset="0"/>
+              </a:rPr>
+              <a:t>&gt;&gt;&gt;a = 5 </a:t>
+            </a:r>
+          </a:p>
+          <a:p>
+            <a:r>
+              <a:rPr lang="en-US" sz="1400" dirty="0">
+                <a:latin typeface="Courier New" panose="02070309020205020404" pitchFamily="49" charset="0"/>
+                <a:cs typeface="Courier New" panose="02070309020205020404" pitchFamily="49" charset="0"/>
+              </a:rPr>
+              <a:t>&gt;&gt;&gt;a += 5 # same as a = a + 5</a:t>
+            </a:r>
+          </a:p>
+          <a:p>
+            <a:r>
+              <a:rPr lang="en-US" sz="1400" dirty="0">
+                <a:latin typeface="Courier New" panose="02070309020205020404" pitchFamily="49" charset="0"/>
+                <a:cs typeface="Courier New" panose="02070309020205020404" pitchFamily="49" charset="0"/>
+              </a:rPr>
+              <a:t>&gt;&gt;&gt;print(a)</a:t>
+            </a:r>
+          </a:p>
+          <a:p>
+            <a:r>
+              <a:rPr lang="en-US" sz="1400" dirty="0">
+                <a:latin typeface="Courier New" panose="02070309020205020404" pitchFamily="49" charset="0"/>
+                <a:cs typeface="Courier New" panose="02070309020205020404" pitchFamily="49" charset="0"/>
+              </a:rPr>
+              <a:t>10</a:t>
+            </a:r>
+          </a:p>
+          <a:p>
+            <a:endParaRPr lang="en-US" sz="1400" dirty="0">
+              <a:latin typeface="Courier New" panose="02070309020205020404" pitchFamily="49" charset="0"/>
+              <a:cs typeface="Courier New" panose="02070309020205020404" pitchFamily="49" charset="0"/>
+            </a:endParaRPr>
+          </a:p>
+          <a:p>
+            <a:r>
+              <a:rPr lang="en-US" sz="1400" dirty="0">
+                <a:latin typeface="Courier New" panose="02070309020205020404" pitchFamily="49" charset="0"/>
+                <a:cs typeface="Courier New" panose="02070309020205020404" pitchFamily="49" charset="0"/>
+              </a:rPr>
+              <a:t>&gt;&gt;&gt;”</a:t>
             </a:r>
             <a:r>
               <a:rPr lang="en-US" sz="1400" dirty="0" err="1">
                 <a:latin typeface="Courier New" panose="02070309020205020404" pitchFamily="49" charset="0"/>
                 <a:cs typeface="Courier New" panose="02070309020205020404" pitchFamily="49" charset="0"/>
               </a:rPr>
-              <a:t>elif</a:t>
-            </a:r>
-            <a:r>
-              <a:rPr lang="en-US" sz="1400" dirty="0">
-                <a:latin typeface="Courier New" panose="02070309020205020404" pitchFamily="49" charset="0"/>
-                <a:cs typeface="Courier New" panose="02070309020205020404" pitchFamily="49" charset="0"/>
-              </a:rPr>
-              <a:t> statements which are a combination of a if and else statement.</a:t>
-            </a:r>
-          </a:p>
-          <a:p>
-            <a:r>
-              <a:rPr lang="en-US" sz="1400" dirty="0">
-                <a:latin typeface="Courier New" panose="02070309020205020404" pitchFamily="49" charset="0"/>
-                <a:cs typeface="Courier New" panose="02070309020205020404" pitchFamily="49" charset="0"/>
-              </a:rPr>
-              <a:t>&gt;&gt;&gt;num = 5</a:t>
-            </a:r>
-          </a:p>
-          <a:p>
-            <a:r>
-              <a:rPr lang="en-US" sz="1400" dirty="0">
-                <a:latin typeface="Courier New" panose="02070309020205020404" pitchFamily="49" charset="0"/>
-                <a:cs typeface="Courier New" panose="02070309020205020404" pitchFamily="49" charset="0"/>
-              </a:rPr>
-              <a:t>&gt;&gt;&gt;if num == 4:</a:t>
-            </a:r>
-          </a:p>
-          <a:p>
-            <a:r>
-              <a:rPr lang="en-US" sz="1400" dirty="0">
-                <a:latin typeface="Courier New" panose="02070309020205020404" pitchFamily="49" charset="0"/>
-                <a:cs typeface="Courier New" panose="02070309020205020404" pitchFamily="49" charset="0"/>
-              </a:rPr>
-              <a:t>...  print("num is 4")</a:t>
-            </a:r>
-          </a:p>
-          <a:p>
-            <a:r>
-              <a:rPr lang="en-US" sz="1400" dirty="0">
-                <a:latin typeface="Courier New" panose="02070309020205020404" pitchFamily="49" charset="0"/>
-                <a:cs typeface="Courier New" panose="02070309020205020404" pitchFamily="49" charset="0"/>
-              </a:rPr>
-              <a:t>...</a:t>
-            </a:r>
-            <a:r>
-              <a:rPr lang="en-US" sz="1400" dirty="0" err="1">
-                <a:latin typeface="Courier New" panose="02070309020205020404" pitchFamily="49" charset="0"/>
-                <a:cs typeface="Courier New" panose="02070309020205020404" pitchFamily="49" charset="0"/>
-              </a:rPr>
-              <a:t>elif</a:t>
-            </a:r>
-            <a:r>
-              <a:rPr lang="en-US" sz="1400" dirty="0">
-                <a:latin typeface="Courier New" panose="02070309020205020404" pitchFamily="49" charset="0"/>
-                <a:cs typeface="Courier New" panose="02070309020205020404" pitchFamily="49" charset="0"/>
-              </a:rPr>
-              <a:t> num == 5:</a:t>
-            </a:r>
-          </a:p>
-          <a:p>
-            <a:r>
-              <a:rPr lang="en-US" sz="1400" dirty="0">
-                <a:latin typeface="Courier New" panose="02070309020205020404" pitchFamily="49" charset="0"/>
-                <a:cs typeface="Courier New" panose="02070309020205020404" pitchFamily="49" charset="0"/>
-              </a:rPr>
-              <a:t>...  print("num is 5")</a:t>
-            </a:r>
-          </a:p>
-          <a:p>
-            <a:r>
-              <a:rPr lang="en-US" sz="1400" dirty="0">
-                <a:latin typeface="Courier New" panose="02070309020205020404" pitchFamily="49" charset="0"/>
-                <a:cs typeface="Courier New" panose="02070309020205020404" pitchFamily="49" charset="0"/>
-              </a:rPr>
-              <a:t>...else:</a:t>
-            </a:r>
-          </a:p>
-          <a:p>
-            <a:r>
-              <a:rPr lang="en-US" sz="1400" dirty="0">
-                <a:latin typeface="Courier New" panose="02070309020205020404" pitchFamily="49" charset="0"/>
-                <a:cs typeface="Courier New" panose="02070309020205020404" pitchFamily="49" charset="0"/>
-              </a:rPr>
-              <a:t>...  print("num is something else")</a:t>
-            </a:r>
-          </a:p>
-          <a:p>
-            <a:r>
-              <a:rPr lang="en-US" sz="1400" dirty="0">
-                <a:latin typeface="Courier New" panose="02070309020205020404" pitchFamily="49" charset="0"/>
-                <a:cs typeface="Courier New" panose="02070309020205020404" pitchFamily="49" charset="0"/>
-              </a:rPr>
-              <a:t>num is 5</a:t>
+              <a:t>hello”.upper</a:t>
+            </a:r>
+            <a:r>
+              <a:rPr lang="en-US" sz="1400" dirty="0">
+                <a:latin typeface="Courier New" panose="02070309020205020404" pitchFamily="49" charset="0"/>
+                <a:cs typeface="Courier New" panose="02070309020205020404" pitchFamily="49" charset="0"/>
+              </a:rPr>
+              <a:t>() # all characters become uppercase</a:t>
+            </a:r>
+            <a:br>
+              <a:rPr lang="en-US" sz="1400" dirty="0">
+                <a:latin typeface="Courier New" panose="02070309020205020404" pitchFamily="49" charset="0"/>
+                <a:cs typeface="Courier New" panose="02070309020205020404" pitchFamily="49" charset="0"/>
+              </a:rPr>
+            </a:br>
+            <a:r>
+              <a:rPr lang="en-US" sz="1400" dirty="0">
+                <a:latin typeface="Courier New" panose="02070309020205020404" pitchFamily="49" charset="0"/>
+                <a:cs typeface="Courier New" panose="02070309020205020404" pitchFamily="49" charset="0"/>
+              </a:rPr>
+              <a:t>’HELLO’</a:t>
             </a:r>
           </a:p>
         </p:txBody>
@@ -6224,7 +6390,7 @@
     </p:spTree>
     <p:extLst>
       <p:ext uri="{BB962C8B-B14F-4D97-AF65-F5344CB8AC3E}">
-        <p14:creationId xmlns:p14="http://schemas.microsoft.com/office/powerpoint/2010/main" val="1879729444"/>
+        <p14:creationId xmlns:p14="http://schemas.microsoft.com/office/powerpoint/2010/main" val="1506647160"/>
       </p:ext>
     </p:extLst>
   </p:cSld>

</xml_diff>